<commit_message>
updated wireframe following first user engagement session
</commit_message>
<xml_diff>
--- a/user-engagement/dashboard-wireframe.pptx
+++ b/user-engagement/dashboard-wireframe.pptx
@@ -4,8 +4,12 @@
   <p:sldMasterIdLst>
     <p:sldMasterId id="2147483648" r:id="rId1"/>
   </p:sldMasterIdLst>
+  <p:notesMasterIdLst>
+    <p:notesMasterId r:id="rId4"/>
+  </p:notesMasterIdLst>
   <p:sldIdLst>
     <p:sldId id="256" r:id="rId2"/>
+    <p:sldId id="257" r:id="rId3"/>
   </p:sldIdLst>
   <p:sldSz cx="12192000" cy="6858000"/>
   <p:notesSz cx="6858000" cy="9144000"/>
@@ -104,7 +108,536 @@
       </a:defRPr>
     </a:lvl9pPr>
   </p:defaultTextStyle>
+  <p:extLst>
+    <p:ext uri="{EFAFB233-063F-42B5-8137-9DF3F51BA10A}">
+      <p15:sldGuideLst xmlns:p15="http://schemas.microsoft.com/office/powerpoint/2012/main"/>
+    </p:ext>
+  </p:extLst>
 </p:presentation>
+</file>
+
+<file path=ppt/notesMasters/notesMaster1.xml><?xml version="1.0" encoding="utf-8"?>
+<p:notesMaster xmlns:a="http://schemas.openxmlformats.org/drawingml/2006/main" xmlns:r="http://schemas.openxmlformats.org/officeDocument/2006/relationships" xmlns:p="http://schemas.openxmlformats.org/presentationml/2006/main">
+  <p:cSld>
+    <p:bg>
+      <p:bgRef idx="1001">
+        <a:schemeClr val="bg1"/>
+      </p:bgRef>
+    </p:bg>
+    <p:spTree>
+      <p:nvGrpSpPr>
+        <p:cNvPr id="1" name=""/>
+        <p:cNvGrpSpPr/>
+        <p:nvPr/>
+      </p:nvGrpSpPr>
+      <p:grpSpPr>
+        <a:xfrm>
+          <a:off x="0" y="0"/>
+          <a:ext cx="0" cy="0"/>
+          <a:chOff x="0" y="0"/>
+          <a:chExt cx="0" cy="0"/>
+        </a:xfrm>
+      </p:grpSpPr>
+      <p:sp>
+        <p:nvSpPr>
+          <p:cNvPr id="2" name="Header Placeholder 1"/>
+          <p:cNvSpPr>
+            <a:spLocks noGrp="1"/>
+          </p:cNvSpPr>
+          <p:nvPr>
+            <p:ph type="hdr" sz="quarter"/>
+          </p:nvPr>
+        </p:nvSpPr>
+        <p:spPr>
+          <a:xfrm>
+            <a:off x="0" y="0"/>
+            <a:ext cx="2971800" cy="458788"/>
+          </a:xfrm>
+          <a:prstGeom prst="rect">
+            <a:avLst/>
+          </a:prstGeom>
+        </p:spPr>
+        <p:txBody>
+          <a:bodyPr vert="horz" lIns="91440" tIns="45720" rIns="91440" bIns="45720" rtlCol="0"/>
+          <a:lstStyle>
+            <a:lvl1pPr algn="l">
+              <a:defRPr sz="1200"/>
+            </a:lvl1pPr>
+          </a:lstStyle>
+          <a:p>
+            <a:endParaRPr lang="en-GB"/>
+          </a:p>
+        </p:txBody>
+      </p:sp>
+      <p:sp>
+        <p:nvSpPr>
+          <p:cNvPr id="3" name="Date Placeholder 2"/>
+          <p:cNvSpPr>
+            <a:spLocks noGrp="1"/>
+          </p:cNvSpPr>
+          <p:nvPr>
+            <p:ph type="dt" idx="1"/>
+          </p:nvPr>
+        </p:nvSpPr>
+        <p:spPr>
+          <a:xfrm>
+            <a:off x="3884613" y="0"/>
+            <a:ext cx="2971800" cy="458788"/>
+          </a:xfrm>
+          <a:prstGeom prst="rect">
+            <a:avLst/>
+          </a:prstGeom>
+        </p:spPr>
+        <p:txBody>
+          <a:bodyPr vert="horz" lIns="91440" tIns="45720" rIns="91440" bIns="45720" rtlCol="0"/>
+          <a:lstStyle>
+            <a:lvl1pPr algn="r">
+              <a:defRPr sz="1200"/>
+            </a:lvl1pPr>
+          </a:lstStyle>
+          <a:p>
+            <a:fld id="{5C6E83F9-F437-47E6-9D22-5335D3BB4A11}" type="datetimeFigureOut">
+              <a:rPr lang="en-GB" smtClean="0"/>
+              <a:t>15/04/2021</a:t>
+            </a:fld>
+            <a:endParaRPr lang="en-GB"/>
+          </a:p>
+        </p:txBody>
+      </p:sp>
+      <p:sp>
+        <p:nvSpPr>
+          <p:cNvPr id="4" name="Slide Image Placeholder 3"/>
+          <p:cNvSpPr>
+            <a:spLocks noGrp="1" noRot="1" noChangeAspect="1"/>
+          </p:cNvSpPr>
+          <p:nvPr>
+            <p:ph type="sldImg" idx="2"/>
+          </p:nvPr>
+        </p:nvSpPr>
+        <p:spPr>
+          <a:xfrm>
+            <a:off x="685800" y="1143000"/>
+            <a:ext cx="5486400" cy="3086100"/>
+          </a:xfrm>
+          <a:prstGeom prst="rect">
+            <a:avLst/>
+          </a:prstGeom>
+          <a:noFill/>
+          <a:ln w="12700">
+            <a:solidFill>
+              <a:prstClr val="black"/>
+            </a:solidFill>
+          </a:ln>
+        </p:spPr>
+        <p:txBody>
+          <a:bodyPr vert="horz" lIns="91440" tIns="45720" rIns="91440" bIns="45720" rtlCol="0" anchor="ctr"/>
+          <a:lstStyle/>
+          <a:p>
+            <a:endParaRPr lang="en-GB"/>
+          </a:p>
+        </p:txBody>
+      </p:sp>
+      <p:sp>
+        <p:nvSpPr>
+          <p:cNvPr id="5" name="Notes Placeholder 4"/>
+          <p:cNvSpPr>
+            <a:spLocks noGrp="1"/>
+          </p:cNvSpPr>
+          <p:nvPr>
+            <p:ph type="body" sz="quarter" idx="3"/>
+          </p:nvPr>
+        </p:nvSpPr>
+        <p:spPr>
+          <a:xfrm>
+            <a:off x="685800" y="4400550"/>
+            <a:ext cx="5486400" cy="3600450"/>
+          </a:xfrm>
+          <a:prstGeom prst="rect">
+            <a:avLst/>
+          </a:prstGeom>
+        </p:spPr>
+        <p:txBody>
+          <a:bodyPr vert="horz" lIns="91440" tIns="45720" rIns="91440" bIns="45720" rtlCol="0"/>
+          <a:lstStyle/>
+          <a:p>
+            <a:pPr lvl="0"/>
+            <a:r>
+              <a:rPr lang="en-US"/>
+              <a:t>Click to edit Master text styles</a:t>
+            </a:r>
+          </a:p>
+          <a:p>
+            <a:pPr lvl="1"/>
+            <a:r>
+              <a:rPr lang="en-US"/>
+              <a:t>Second level</a:t>
+            </a:r>
+          </a:p>
+          <a:p>
+            <a:pPr lvl="2"/>
+            <a:r>
+              <a:rPr lang="en-US"/>
+              <a:t>Third level</a:t>
+            </a:r>
+          </a:p>
+          <a:p>
+            <a:pPr lvl="3"/>
+            <a:r>
+              <a:rPr lang="en-US"/>
+              <a:t>Fourth level</a:t>
+            </a:r>
+          </a:p>
+          <a:p>
+            <a:pPr lvl="4"/>
+            <a:r>
+              <a:rPr lang="en-US"/>
+              <a:t>Fifth level</a:t>
+            </a:r>
+            <a:endParaRPr lang="en-GB"/>
+          </a:p>
+        </p:txBody>
+      </p:sp>
+      <p:sp>
+        <p:nvSpPr>
+          <p:cNvPr id="6" name="Footer Placeholder 5"/>
+          <p:cNvSpPr>
+            <a:spLocks noGrp="1"/>
+          </p:cNvSpPr>
+          <p:nvPr>
+            <p:ph type="ftr" sz="quarter" idx="4"/>
+          </p:nvPr>
+        </p:nvSpPr>
+        <p:spPr>
+          <a:xfrm>
+            <a:off x="0" y="8685213"/>
+            <a:ext cx="2971800" cy="458787"/>
+          </a:xfrm>
+          <a:prstGeom prst="rect">
+            <a:avLst/>
+          </a:prstGeom>
+        </p:spPr>
+        <p:txBody>
+          <a:bodyPr vert="horz" lIns="91440" tIns="45720" rIns="91440" bIns="45720" rtlCol="0" anchor="b"/>
+          <a:lstStyle>
+            <a:lvl1pPr algn="l">
+              <a:defRPr sz="1200"/>
+            </a:lvl1pPr>
+          </a:lstStyle>
+          <a:p>
+            <a:endParaRPr lang="en-GB"/>
+          </a:p>
+        </p:txBody>
+      </p:sp>
+      <p:sp>
+        <p:nvSpPr>
+          <p:cNvPr id="7" name="Slide Number Placeholder 6"/>
+          <p:cNvSpPr>
+            <a:spLocks noGrp="1"/>
+          </p:cNvSpPr>
+          <p:nvPr>
+            <p:ph type="sldNum" sz="quarter" idx="5"/>
+          </p:nvPr>
+        </p:nvSpPr>
+        <p:spPr>
+          <a:xfrm>
+            <a:off x="3884613" y="8685213"/>
+            <a:ext cx="2971800" cy="458787"/>
+          </a:xfrm>
+          <a:prstGeom prst="rect">
+            <a:avLst/>
+          </a:prstGeom>
+        </p:spPr>
+        <p:txBody>
+          <a:bodyPr vert="horz" lIns="91440" tIns="45720" rIns="91440" bIns="45720" rtlCol="0" anchor="b"/>
+          <a:lstStyle>
+            <a:lvl1pPr algn="r">
+              <a:defRPr sz="1200"/>
+            </a:lvl1pPr>
+          </a:lstStyle>
+          <a:p>
+            <a:fld id="{79CAC023-9992-44AA-A48E-91941411227E}" type="slidenum">
+              <a:rPr lang="en-GB" smtClean="0"/>
+              <a:t>‹#›</a:t>
+            </a:fld>
+            <a:endParaRPr lang="en-GB"/>
+          </a:p>
+        </p:txBody>
+      </p:sp>
+    </p:spTree>
+    <p:extLst>
+      <p:ext uri="{BB962C8B-B14F-4D97-AF65-F5344CB8AC3E}">
+        <p14:creationId xmlns:p14="http://schemas.microsoft.com/office/powerpoint/2010/main" val="2324904413"/>
+      </p:ext>
+    </p:extLst>
+  </p:cSld>
+  <p:clrMap bg1="lt1" tx1="dk1" bg2="lt2" tx2="dk2" accent1="accent1" accent2="accent2" accent3="accent3" accent4="accent4" accent5="accent5" accent6="accent6" hlink="hlink" folHlink="folHlink"/>
+  <p:notesStyle>
+    <a:lvl1pPr marL="0" algn="l" defTabSz="914400" rtl="0" eaLnBrk="1" latinLnBrk="0" hangingPunct="1">
+      <a:defRPr sz="1200" kern="1200">
+        <a:solidFill>
+          <a:schemeClr val="tx1"/>
+        </a:solidFill>
+        <a:latin typeface="+mn-lt"/>
+        <a:ea typeface="+mn-ea"/>
+        <a:cs typeface="+mn-cs"/>
+      </a:defRPr>
+    </a:lvl1pPr>
+    <a:lvl2pPr marL="457200" algn="l" defTabSz="914400" rtl="0" eaLnBrk="1" latinLnBrk="0" hangingPunct="1">
+      <a:defRPr sz="1200" kern="1200">
+        <a:solidFill>
+          <a:schemeClr val="tx1"/>
+        </a:solidFill>
+        <a:latin typeface="+mn-lt"/>
+        <a:ea typeface="+mn-ea"/>
+        <a:cs typeface="+mn-cs"/>
+      </a:defRPr>
+    </a:lvl2pPr>
+    <a:lvl3pPr marL="914400" algn="l" defTabSz="914400" rtl="0" eaLnBrk="1" latinLnBrk="0" hangingPunct="1">
+      <a:defRPr sz="1200" kern="1200">
+        <a:solidFill>
+          <a:schemeClr val="tx1"/>
+        </a:solidFill>
+        <a:latin typeface="+mn-lt"/>
+        <a:ea typeface="+mn-ea"/>
+        <a:cs typeface="+mn-cs"/>
+      </a:defRPr>
+    </a:lvl3pPr>
+    <a:lvl4pPr marL="1371600" algn="l" defTabSz="914400" rtl="0" eaLnBrk="1" latinLnBrk="0" hangingPunct="1">
+      <a:defRPr sz="1200" kern="1200">
+        <a:solidFill>
+          <a:schemeClr val="tx1"/>
+        </a:solidFill>
+        <a:latin typeface="+mn-lt"/>
+        <a:ea typeface="+mn-ea"/>
+        <a:cs typeface="+mn-cs"/>
+      </a:defRPr>
+    </a:lvl4pPr>
+    <a:lvl5pPr marL="1828800" algn="l" defTabSz="914400" rtl="0" eaLnBrk="1" latinLnBrk="0" hangingPunct="1">
+      <a:defRPr sz="1200" kern="1200">
+        <a:solidFill>
+          <a:schemeClr val="tx1"/>
+        </a:solidFill>
+        <a:latin typeface="+mn-lt"/>
+        <a:ea typeface="+mn-ea"/>
+        <a:cs typeface="+mn-cs"/>
+      </a:defRPr>
+    </a:lvl5pPr>
+    <a:lvl6pPr marL="2286000" algn="l" defTabSz="914400" rtl="0" eaLnBrk="1" latinLnBrk="0" hangingPunct="1">
+      <a:defRPr sz="1200" kern="1200">
+        <a:solidFill>
+          <a:schemeClr val="tx1"/>
+        </a:solidFill>
+        <a:latin typeface="+mn-lt"/>
+        <a:ea typeface="+mn-ea"/>
+        <a:cs typeface="+mn-cs"/>
+      </a:defRPr>
+    </a:lvl6pPr>
+    <a:lvl7pPr marL="2743200" algn="l" defTabSz="914400" rtl="0" eaLnBrk="1" latinLnBrk="0" hangingPunct="1">
+      <a:defRPr sz="1200" kern="1200">
+        <a:solidFill>
+          <a:schemeClr val="tx1"/>
+        </a:solidFill>
+        <a:latin typeface="+mn-lt"/>
+        <a:ea typeface="+mn-ea"/>
+        <a:cs typeface="+mn-cs"/>
+      </a:defRPr>
+    </a:lvl7pPr>
+    <a:lvl8pPr marL="3200400" algn="l" defTabSz="914400" rtl="0" eaLnBrk="1" latinLnBrk="0" hangingPunct="1">
+      <a:defRPr sz="1200" kern="1200">
+        <a:solidFill>
+          <a:schemeClr val="tx1"/>
+        </a:solidFill>
+        <a:latin typeface="+mn-lt"/>
+        <a:ea typeface="+mn-ea"/>
+        <a:cs typeface="+mn-cs"/>
+      </a:defRPr>
+    </a:lvl8pPr>
+    <a:lvl9pPr marL="3657600" algn="l" defTabSz="914400" rtl="0" eaLnBrk="1" latinLnBrk="0" hangingPunct="1">
+      <a:defRPr sz="1200" kern="1200">
+        <a:solidFill>
+          <a:schemeClr val="tx1"/>
+        </a:solidFill>
+        <a:latin typeface="+mn-lt"/>
+        <a:ea typeface="+mn-ea"/>
+        <a:cs typeface="+mn-cs"/>
+      </a:defRPr>
+    </a:lvl9pPr>
+  </p:notesStyle>
+</p:notesMaster>
+</file>
+
+<file path=ppt/notesSlides/notesSlide1.xml><?xml version="1.0" encoding="utf-8"?>
+<p:notes xmlns:a="http://schemas.openxmlformats.org/drawingml/2006/main" xmlns:r="http://schemas.openxmlformats.org/officeDocument/2006/relationships" xmlns:p="http://schemas.openxmlformats.org/presentationml/2006/main">
+  <p:cSld>
+    <p:spTree>
+      <p:nvGrpSpPr>
+        <p:cNvPr id="1" name=""/>
+        <p:cNvGrpSpPr/>
+        <p:nvPr/>
+      </p:nvGrpSpPr>
+      <p:grpSpPr>
+        <a:xfrm>
+          <a:off x="0" y="0"/>
+          <a:ext cx="0" cy="0"/>
+          <a:chOff x="0" y="0"/>
+          <a:chExt cx="0" cy="0"/>
+        </a:xfrm>
+      </p:grpSpPr>
+      <p:sp>
+        <p:nvSpPr>
+          <p:cNvPr id="2" name="Slide Image Placeholder 1"/>
+          <p:cNvSpPr>
+            <a:spLocks noGrp="1" noRot="1" noChangeAspect="1"/>
+          </p:cNvSpPr>
+          <p:nvPr>
+            <p:ph type="sldImg"/>
+          </p:nvPr>
+        </p:nvSpPr>
+        <p:spPr/>
+      </p:sp>
+      <p:sp>
+        <p:nvSpPr>
+          <p:cNvPr id="3" name="Notes Placeholder 2"/>
+          <p:cNvSpPr>
+            <a:spLocks noGrp="1"/>
+          </p:cNvSpPr>
+          <p:nvPr>
+            <p:ph type="body" idx="1"/>
+          </p:nvPr>
+        </p:nvSpPr>
+        <p:spPr/>
+        <p:txBody>
+          <a:bodyPr/>
+          <a:lstStyle/>
+          <a:p>
+            <a:r>
+              <a:rPr lang="en-GB" dirty="0"/>
+              <a:t>Sentiment</a:t>
+            </a:r>
+          </a:p>
+        </p:txBody>
+      </p:sp>
+      <p:sp>
+        <p:nvSpPr>
+          <p:cNvPr id="4" name="Slide Number Placeholder 3"/>
+          <p:cNvSpPr>
+            <a:spLocks noGrp="1"/>
+          </p:cNvSpPr>
+          <p:nvPr>
+            <p:ph type="sldNum" sz="quarter" idx="5"/>
+          </p:nvPr>
+        </p:nvSpPr>
+        <p:spPr/>
+        <p:txBody>
+          <a:bodyPr/>
+          <a:lstStyle/>
+          <a:p>
+            <a:fld id="{79CAC023-9992-44AA-A48E-91941411227E}" type="slidenum">
+              <a:rPr lang="en-GB" smtClean="0"/>
+              <a:t>1</a:t>
+            </a:fld>
+            <a:endParaRPr lang="en-GB"/>
+          </a:p>
+        </p:txBody>
+      </p:sp>
+    </p:spTree>
+    <p:extLst>
+      <p:ext uri="{BB962C8B-B14F-4D97-AF65-F5344CB8AC3E}">
+        <p14:creationId xmlns:p14="http://schemas.microsoft.com/office/powerpoint/2010/main" val="3451115275"/>
+      </p:ext>
+    </p:extLst>
+  </p:cSld>
+  <p:clrMapOvr>
+    <a:masterClrMapping/>
+  </p:clrMapOvr>
+</p:notes>
+</file>
+
+<file path=ppt/notesSlides/notesSlide2.xml><?xml version="1.0" encoding="utf-8"?>
+<p:notes xmlns:a="http://schemas.openxmlformats.org/drawingml/2006/main" xmlns:r="http://schemas.openxmlformats.org/officeDocument/2006/relationships" xmlns:p="http://schemas.openxmlformats.org/presentationml/2006/main">
+  <p:cSld>
+    <p:spTree>
+      <p:nvGrpSpPr>
+        <p:cNvPr id="1" name=""/>
+        <p:cNvGrpSpPr/>
+        <p:nvPr/>
+      </p:nvGrpSpPr>
+      <p:grpSpPr>
+        <a:xfrm>
+          <a:off x="0" y="0"/>
+          <a:ext cx="0" cy="0"/>
+          <a:chOff x="0" y="0"/>
+          <a:chExt cx="0" cy="0"/>
+        </a:xfrm>
+      </p:grpSpPr>
+      <p:sp>
+        <p:nvSpPr>
+          <p:cNvPr id="2" name="Slide Image Placeholder 1"/>
+          <p:cNvSpPr>
+            <a:spLocks noGrp="1" noRot="1" noChangeAspect="1"/>
+          </p:cNvSpPr>
+          <p:nvPr>
+            <p:ph type="sldImg"/>
+          </p:nvPr>
+        </p:nvSpPr>
+        <p:spPr/>
+      </p:sp>
+      <p:sp>
+        <p:nvSpPr>
+          <p:cNvPr id="3" name="Notes Placeholder 2"/>
+          <p:cNvSpPr>
+            <a:spLocks noGrp="1"/>
+          </p:cNvSpPr>
+          <p:nvPr>
+            <p:ph type="body" idx="1"/>
+          </p:nvPr>
+        </p:nvSpPr>
+        <p:spPr/>
+        <p:txBody>
+          <a:bodyPr/>
+          <a:lstStyle/>
+          <a:p>
+            <a:r>
+              <a:rPr lang="en-GB" dirty="0"/>
+              <a:t>Topic</a:t>
+            </a:r>
+          </a:p>
+        </p:txBody>
+      </p:sp>
+      <p:sp>
+        <p:nvSpPr>
+          <p:cNvPr id="4" name="Slide Number Placeholder 3"/>
+          <p:cNvSpPr>
+            <a:spLocks noGrp="1"/>
+          </p:cNvSpPr>
+          <p:nvPr>
+            <p:ph type="sldNum" sz="quarter" idx="5"/>
+          </p:nvPr>
+        </p:nvSpPr>
+        <p:spPr/>
+        <p:txBody>
+          <a:bodyPr/>
+          <a:lstStyle/>
+          <a:p>
+            <a:fld id="{79CAC023-9992-44AA-A48E-91941411227E}" type="slidenum">
+              <a:rPr lang="en-GB" smtClean="0"/>
+              <a:t>2</a:t>
+            </a:fld>
+            <a:endParaRPr lang="en-GB"/>
+          </a:p>
+        </p:txBody>
+      </p:sp>
+    </p:spTree>
+    <p:extLst>
+      <p:ext uri="{BB962C8B-B14F-4D97-AF65-F5344CB8AC3E}">
+        <p14:creationId xmlns:p14="http://schemas.microsoft.com/office/powerpoint/2010/main" val="2339614411"/>
+      </p:ext>
+    </p:extLst>
+  </p:cSld>
+  <p:clrMapOvr>
+    <a:masterClrMapping/>
+  </p:clrMapOvr>
+</p:notes>
 </file>
 
 <file path=ppt/slideLayouts/slideLayout1.xml><?xml version="1.0" encoding="utf-8"?>
@@ -256,7 +789,7 @@
           <a:p>
             <a:fld id="{02DF8D28-C0B4-454A-8231-F26FADBFFDAB}" type="datetimeFigureOut">
               <a:rPr lang="en-GB" smtClean="0"/>
-              <a:t>08/04/2021</a:t>
+              <a:t>15/04/2021</a:t>
             </a:fld>
             <a:endParaRPr lang="en-GB"/>
           </a:p>
@@ -456,7 +989,7 @@
           <a:p>
             <a:fld id="{02DF8D28-C0B4-454A-8231-F26FADBFFDAB}" type="datetimeFigureOut">
               <a:rPr lang="en-GB" smtClean="0"/>
-              <a:t>08/04/2021</a:t>
+              <a:t>15/04/2021</a:t>
             </a:fld>
             <a:endParaRPr lang="en-GB"/>
           </a:p>
@@ -666,7 +1199,7 @@
           <a:p>
             <a:fld id="{02DF8D28-C0B4-454A-8231-F26FADBFFDAB}" type="datetimeFigureOut">
               <a:rPr lang="en-GB" smtClean="0"/>
-              <a:t>08/04/2021</a:t>
+              <a:t>15/04/2021</a:t>
             </a:fld>
             <a:endParaRPr lang="en-GB"/>
           </a:p>
@@ -866,7 +1399,7 @@
           <a:p>
             <a:fld id="{02DF8D28-C0B4-454A-8231-F26FADBFFDAB}" type="datetimeFigureOut">
               <a:rPr lang="en-GB" smtClean="0"/>
-              <a:t>08/04/2021</a:t>
+              <a:t>15/04/2021</a:t>
             </a:fld>
             <a:endParaRPr lang="en-GB"/>
           </a:p>
@@ -1142,7 +1675,7 @@
           <a:p>
             <a:fld id="{02DF8D28-C0B4-454A-8231-F26FADBFFDAB}" type="datetimeFigureOut">
               <a:rPr lang="en-GB" smtClean="0"/>
-              <a:t>08/04/2021</a:t>
+              <a:t>15/04/2021</a:t>
             </a:fld>
             <a:endParaRPr lang="en-GB"/>
           </a:p>
@@ -1410,7 +1943,7 @@
           <a:p>
             <a:fld id="{02DF8D28-C0B4-454A-8231-F26FADBFFDAB}" type="datetimeFigureOut">
               <a:rPr lang="en-GB" smtClean="0"/>
-              <a:t>08/04/2021</a:t>
+              <a:t>15/04/2021</a:t>
             </a:fld>
             <a:endParaRPr lang="en-GB"/>
           </a:p>
@@ -1825,7 +2358,7 @@
           <a:p>
             <a:fld id="{02DF8D28-C0B4-454A-8231-F26FADBFFDAB}" type="datetimeFigureOut">
               <a:rPr lang="en-GB" smtClean="0"/>
-              <a:t>08/04/2021</a:t>
+              <a:t>15/04/2021</a:t>
             </a:fld>
             <a:endParaRPr lang="en-GB"/>
           </a:p>
@@ -1967,7 +2500,7 @@
           <a:p>
             <a:fld id="{02DF8D28-C0B4-454A-8231-F26FADBFFDAB}" type="datetimeFigureOut">
               <a:rPr lang="en-GB" smtClean="0"/>
-              <a:t>08/04/2021</a:t>
+              <a:t>15/04/2021</a:t>
             </a:fld>
             <a:endParaRPr lang="en-GB"/>
           </a:p>
@@ -2080,7 +2613,7 @@
           <a:p>
             <a:fld id="{02DF8D28-C0B4-454A-8231-F26FADBFFDAB}" type="datetimeFigureOut">
               <a:rPr lang="en-GB" smtClean="0"/>
-              <a:t>08/04/2021</a:t>
+              <a:t>15/04/2021</a:t>
             </a:fld>
             <a:endParaRPr lang="en-GB"/>
           </a:p>
@@ -2393,7 +2926,7 @@
           <a:p>
             <a:fld id="{02DF8D28-C0B4-454A-8231-F26FADBFFDAB}" type="datetimeFigureOut">
               <a:rPr lang="en-GB" smtClean="0"/>
-              <a:t>08/04/2021</a:t>
+              <a:t>15/04/2021</a:t>
             </a:fld>
             <a:endParaRPr lang="en-GB"/>
           </a:p>
@@ -2682,7 +3215,7 @@
           <a:p>
             <a:fld id="{02DF8D28-C0B4-454A-8231-F26FADBFFDAB}" type="datetimeFigureOut">
               <a:rPr lang="en-GB" smtClean="0"/>
-              <a:t>08/04/2021</a:t>
+              <a:t>15/04/2021</a:t>
             </a:fld>
             <a:endParaRPr lang="en-GB"/>
           </a:p>
@@ -2925,7 +3458,7 @@
           <a:p>
             <a:fld id="{02DF8D28-C0B4-454A-8231-F26FADBFFDAB}" type="datetimeFigureOut">
               <a:rPr lang="en-GB" smtClean="0"/>
-              <a:t>08/04/2021</a:t>
+              <a:t>15/04/2021</a:t>
             </a:fld>
             <a:endParaRPr lang="en-GB"/>
           </a:p>
@@ -3456,8 +3989,8 @@
         </p:nvSpPr>
         <p:spPr>
           <a:xfrm>
-            <a:off x="747601" y="753965"/>
-            <a:ext cx="2390273" cy="433137"/>
+            <a:off x="171115" y="716983"/>
+            <a:ext cx="1989222" cy="433137"/>
           </a:xfrm>
           <a:prstGeom prst="roundRect">
             <a:avLst/>
@@ -3502,8 +4035,8 @@
         </p:nvSpPr>
         <p:spPr>
           <a:xfrm>
-            <a:off x="4541559" y="753963"/>
-            <a:ext cx="2390273" cy="433137"/>
+            <a:off x="2557150" y="716983"/>
+            <a:ext cx="1989221" cy="433137"/>
           </a:xfrm>
           <a:prstGeom prst="roundRect">
             <a:avLst/>
@@ -3548,7 +4081,7 @@
         </p:nvSpPr>
         <p:spPr>
           <a:xfrm>
-            <a:off x="7782065" y="753964"/>
+            <a:off x="7776394" y="721191"/>
             <a:ext cx="4178967" cy="433137"/>
           </a:xfrm>
           <a:prstGeom prst="roundRect">
@@ -3675,7 +4208,7 @@
         </p:nvSpPr>
         <p:spPr>
           <a:xfrm>
-            <a:off x="4457041" y="5213322"/>
+            <a:off x="3795292" y="5189519"/>
             <a:ext cx="1041387" cy="369332"/>
           </a:xfrm>
           <a:prstGeom prst="rect">
@@ -3711,7 +4244,7 @@
         </p:nvSpPr>
         <p:spPr>
           <a:xfrm>
-            <a:off x="6529276" y="5204573"/>
+            <a:off x="5155534" y="5188879"/>
             <a:ext cx="862119" cy="369332"/>
           </a:xfrm>
           <a:prstGeom prst="rect">
@@ -4069,8 +4602,8 @@
         </p:nvSpPr>
         <p:spPr>
           <a:xfrm>
-            <a:off x="948126" y="770006"/>
-            <a:ext cx="1989221" cy="369332"/>
+            <a:off x="371640" y="733024"/>
+            <a:ext cx="1655460" cy="369332"/>
           </a:xfrm>
           <a:prstGeom prst="rect">
             <a:avLst/>
@@ -4109,8 +4642,8 @@
         </p:nvSpPr>
         <p:spPr>
           <a:xfrm>
-            <a:off x="4669896" y="785865"/>
-            <a:ext cx="1989221" cy="369332"/>
+            <a:off x="2534940" y="682806"/>
+            <a:ext cx="1989221" cy="461665"/>
           </a:xfrm>
           <a:prstGeom prst="rect">
             <a:avLst/>
@@ -4125,12 +4658,12 @@
           <a:p>
             <a:pPr algn="ctr"/>
             <a:r>
-              <a:rPr lang="en-GB" dirty="0">
+              <a:rPr lang="en-GB" sz="1200" dirty="0">
                 <a:solidFill>
                   <a:schemeClr val="bg1"/>
                 </a:solidFill>
               </a:rPr>
-              <a:t>Filter -- Source</a:t>
+              <a:t>Filter – Parliament (UK/NI/SCO/WAL)</a:t>
             </a:r>
           </a:p>
         </p:txBody>
@@ -5432,7 +5965,7 @@
         </p:nvSpPr>
         <p:spPr>
           <a:xfrm>
-            <a:off x="6780989" y="3685545"/>
+            <a:off x="6795055" y="3677069"/>
             <a:ext cx="301686" cy="369332"/>
           </a:xfrm>
           <a:prstGeom prst="rect">
@@ -5467,7 +6000,7 @@
         </p:nvSpPr>
         <p:spPr>
           <a:xfrm>
-            <a:off x="8156277" y="2543000"/>
+            <a:off x="8221458" y="2526508"/>
             <a:ext cx="301686" cy="369332"/>
           </a:xfrm>
           <a:prstGeom prst="rect">
@@ -5519,6 +6052,249 @@
             <a:r>
               <a:rPr lang="en-GB" dirty="0"/>
               <a:t>7</a:t>
+            </a:r>
+          </a:p>
+        </p:txBody>
+      </p:sp>
+      <p:sp>
+        <p:nvSpPr>
+          <p:cNvPr id="70" name="Rectangle: Rounded Corners 69">
+            <a:extLst>
+              <a:ext uri="{FF2B5EF4-FFF2-40B4-BE49-F238E27FC236}">
+                <a16:creationId xmlns:a16="http://schemas.microsoft.com/office/drawing/2014/main" id="{E61067AB-EE6D-4E87-9D0D-B57A068F6515}"/>
+              </a:ext>
+            </a:extLst>
+          </p:cNvPr>
+          <p:cNvSpPr/>
+          <p:nvPr/>
+        </p:nvSpPr>
+        <p:spPr>
+          <a:xfrm>
+            <a:off x="172451" y="147553"/>
+            <a:ext cx="1594544" cy="369332"/>
+          </a:xfrm>
+          <a:prstGeom prst="roundRect">
+            <a:avLst/>
+          </a:prstGeom>
+        </p:spPr>
+        <p:style>
+          <a:lnRef idx="2">
+            <a:schemeClr val="accent1">
+              <a:shade val="50000"/>
+            </a:schemeClr>
+          </a:lnRef>
+          <a:fillRef idx="1">
+            <a:schemeClr val="accent1"/>
+          </a:fillRef>
+          <a:effectRef idx="0">
+            <a:schemeClr val="accent1"/>
+          </a:effectRef>
+          <a:fontRef idx="minor">
+            <a:schemeClr val="lt1"/>
+          </a:fontRef>
+        </p:style>
+        <p:txBody>
+          <a:bodyPr rtlCol="0" anchor="ctr"/>
+          <a:lstStyle/>
+          <a:p>
+            <a:pPr algn="ctr"/>
+            <a:endParaRPr lang="en-GB"/>
+          </a:p>
+        </p:txBody>
+      </p:sp>
+      <p:sp>
+        <p:nvSpPr>
+          <p:cNvPr id="71" name="TextBox 70">
+            <a:extLst>
+              <a:ext uri="{FF2B5EF4-FFF2-40B4-BE49-F238E27FC236}">
+                <a16:creationId xmlns:a16="http://schemas.microsoft.com/office/drawing/2014/main" id="{D50459A9-C6BD-49B7-8D6C-509F0C7EAD56}"/>
+              </a:ext>
+            </a:extLst>
+          </p:cNvPr>
+          <p:cNvSpPr txBox="1"/>
+          <p:nvPr/>
+        </p:nvSpPr>
+        <p:spPr>
+          <a:xfrm>
+            <a:off x="172454" y="192343"/>
+            <a:ext cx="1594541" cy="261610"/>
+          </a:xfrm>
+          <a:prstGeom prst="rect">
+            <a:avLst/>
+          </a:prstGeom>
+          <a:noFill/>
+        </p:spPr>
+        <p:txBody>
+          <a:bodyPr wrap="square" rtlCol="0">
+            <a:spAutoFit/>
+          </a:bodyPr>
+          <a:lstStyle/>
+          <a:p>
+            <a:pPr algn="ctr"/>
+            <a:r>
+              <a:rPr lang="en-GB" sz="1100" dirty="0">
+                <a:solidFill>
+                  <a:schemeClr val="bg1"/>
+                </a:solidFill>
+              </a:rPr>
+              <a:t>Toggle: Topic/Sentiment</a:t>
+            </a:r>
+          </a:p>
+        </p:txBody>
+      </p:sp>
+      <p:sp>
+        <p:nvSpPr>
+          <p:cNvPr id="2" name="TextBox 1">
+            <a:extLst>
+              <a:ext uri="{FF2B5EF4-FFF2-40B4-BE49-F238E27FC236}">
+                <a16:creationId xmlns:a16="http://schemas.microsoft.com/office/drawing/2014/main" id="{CA55914D-CEAC-4F17-AB44-8409E21C3C18}"/>
+              </a:ext>
+            </a:extLst>
+          </p:cNvPr>
+          <p:cNvSpPr txBox="1"/>
+          <p:nvPr/>
+        </p:nvSpPr>
+        <p:spPr>
+          <a:xfrm rot="17739365">
+            <a:off x="9279434" y="4002855"/>
+            <a:ext cx="1441036" cy="276999"/>
+          </a:xfrm>
+          <a:prstGeom prst="rect">
+            <a:avLst/>
+          </a:prstGeom>
+          <a:noFill/>
+        </p:spPr>
+        <p:txBody>
+          <a:bodyPr wrap="none" rtlCol="0">
+            <a:spAutoFit/>
+          </a:bodyPr>
+          <a:lstStyle/>
+          <a:p>
+            <a:r>
+              <a:rPr lang="en-GB" sz="1200" dirty="0"/>
+              <a:t>Parliament in recess</a:t>
+            </a:r>
+          </a:p>
+        </p:txBody>
+      </p:sp>
+      <p:sp>
+        <p:nvSpPr>
+          <p:cNvPr id="72" name="TextBox 71">
+            <a:extLst>
+              <a:ext uri="{FF2B5EF4-FFF2-40B4-BE49-F238E27FC236}">
+                <a16:creationId xmlns:a16="http://schemas.microsoft.com/office/drawing/2014/main" id="{BEE4FB12-2034-4A6B-88E4-58461801753C}"/>
+              </a:ext>
+            </a:extLst>
+          </p:cNvPr>
+          <p:cNvSpPr txBox="1"/>
+          <p:nvPr/>
+        </p:nvSpPr>
+        <p:spPr>
+          <a:xfrm>
+            <a:off x="6424969" y="5196188"/>
+            <a:ext cx="1314034" cy="369332"/>
+          </a:xfrm>
+          <a:prstGeom prst="rect">
+            <a:avLst/>
+          </a:prstGeom>
+          <a:noFill/>
+        </p:spPr>
+        <p:txBody>
+          <a:bodyPr wrap="square" rtlCol="0">
+            <a:spAutoFit/>
+          </a:bodyPr>
+          <a:lstStyle/>
+          <a:p>
+            <a:pPr algn="ctr"/>
+            <a:r>
+              <a:rPr lang="en-GB" dirty="0"/>
+              <a:t>Sentiment</a:t>
+            </a:r>
+          </a:p>
+        </p:txBody>
+      </p:sp>
+      <p:sp>
+        <p:nvSpPr>
+          <p:cNvPr id="75" name="Rectangle: Rounded Corners 74">
+            <a:extLst>
+              <a:ext uri="{FF2B5EF4-FFF2-40B4-BE49-F238E27FC236}">
+                <a16:creationId xmlns:a16="http://schemas.microsoft.com/office/drawing/2014/main" id="{24206795-EFD1-4DCF-ACAC-13FC0BE0A71C}"/>
+              </a:ext>
+            </a:extLst>
+          </p:cNvPr>
+          <p:cNvSpPr/>
+          <p:nvPr/>
+        </p:nvSpPr>
+        <p:spPr>
+          <a:xfrm>
+            <a:off x="5051627" y="716983"/>
+            <a:ext cx="1989221" cy="433137"/>
+          </a:xfrm>
+          <a:prstGeom prst="roundRect">
+            <a:avLst/>
+          </a:prstGeom>
+        </p:spPr>
+        <p:style>
+          <a:lnRef idx="2">
+            <a:schemeClr val="accent1">
+              <a:shade val="50000"/>
+            </a:schemeClr>
+          </a:lnRef>
+          <a:fillRef idx="1">
+            <a:schemeClr val="accent1"/>
+          </a:fillRef>
+          <a:effectRef idx="0">
+            <a:schemeClr val="accent1"/>
+          </a:effectRef>
+          <a:fontRef idx="minor">
+            <a:schemeClr val="lt1"/>
+          </a:fontRef>
+        </p:style>
+        <p:txBody>
+          <a:bodyPr rtlCol="0" anchor="ctr"/>
+          <a:lstStyle/>
+          <a:p>
+            <a:pPr algn="ctr"/>
+            <a:endParaRPr lang="en-GB"/>
+          </a:p>
+        </p:txBody>
+      </p:sp>
+      <p:sp>
+        <p:nvSpPr>
+          <p:cNvPr id="76" name="TextBox 75">
+            <a:extLst>
+              <a:ext uri="{FF2B5EF4-FFF2-40B4-BE49-F238E27FC236}">
+                <a16:creationId xmlns:a16="http://schemas.microsoft.com/office/drawing/2014/main" id="{B21811AC-55B8-4FAE-AF8B-B1F038CAE214}"/>
+              </a:ext>
+            </a:extLst>
+          </p:cNvPr>
+          <p:cNvSpPr txBox="1"/>
+          <p:nvPr/>
+        </p:nvSpPr>
+        <p:spPr>
+          <a:xfrm>
+            <a:off x="5252152" y="733024"/>
+            <a:ext cx="1655459" cy="369332"/>
+          </a:xfrm>
+          <a:prstGeom prst="rect">
+            <a:avLst/>
+          </a:prstGeom>
+          <a:noFill/>
+        </p:spPr>
+        <p:txBody>
+          <a:bodyPr wrap="square" rtlCol="0">
+            <a:spAutoFit/>
+          </a:bodyPr>
+          <a:lstStyle/>
+          <a:p>
+            <a:pPr algn="ctr"/>
+            <a:r>
+              <a:rPr lang="en-GB" dirty="0">
+                <a:solidFill>
+                  <a:schemeClr val="bg1"/>
+                </a:solidFill>
+              </a:rPr>
+              <a:t>Filter -- Speaker</a:t>
             </a:r>
           </a:p>
         </p:txBody>
@@ -5527,6 +6303,2788 @@
     <p:extLst>
       <p:ext uri="{BB962C8B-B14F-4D97-AF65-F5344CB8AC3E}">
         <p14:creationId xmlns:p14="http://schemas.microsoft.com/office/powerpoint/2010/main" val="3423769480"/>
+      </p:ext>
+    </p:extLst>
+  </p:cSld>
+  <p:clrMapOvr>
+    <a:masterClrMapping/>
+  </p:clrMapOvr>
+</p:sld>
+</file>
+
+<file path=ppt/slides/slide2.xml><?xml version="1.0" encoding="utf-8"?>
+<p:sld xmlns:a="http://schemas.openxmlformats.org/drawingml/2006/main" xmlns:r="http://schemas.openxmlformats.org/officeDocument/2006/relationships" xmlns:p="http://schemas.openxmlformats.org/presentationml/2006/main">
+  <p:cSld>
+    <p:spTree>
+      <p:nvGrpSpPr>
+        <p:cNvPr id="1" name=""/>
+        <p:cNvGrpSpPr/>
+        <p:nvPr/>
+      </p:nvGrpSpPr>
+      <p:grpSpPr>
+        <a:xfrm>
+          <a:off x="0" y="0"/>
+          <a:ext cx="0" cy="0"/>
+          <a:chOff x="0" y="0"/>
+          <a:chExt cx="0" cy="0"/>
+        </a:xfrm>
+      </p:grpSpPr>
+      <p:sp>
+        <p:nvSpPr>
+          <p:cNvPr id="22" name="Rectangle 21">
+            <a:extLst>
+              <a:ext uri="{FF2B5EF4-FFF2-40B4-BE49-F238E27FC236}">
+                <a16:creationId xmlns:a16="http://schemas.microsoft.com/office/drawing/2014/main" id="{C67874B4-3403-4B43-A5CC-E0BBD7F2B85E}"/>
+              </a:ext>
+            </a:extLst>
+          </p:cNvPr>
+          <p:cNvSpPr/>
+          <p:nvPr/>
+        </p:nvSpPr>
+        <p:spPr>
+          <a:xfrm>
+            <a:off x="336887" y="5196559"/>
+            <a:ext cx="11618474" cy="1492996"/>
+          </a:xfrm>
+          <a:prstGeom prst="rect">
+            <a:avLst/>
+          </a:prstGeom>
+          <a:solidFill>
+            <a:schemeClr val="bg1"/>
+          </a:solidFill>
+          <a:ln>
+            <a:solidFill>
+              <a:schemeClr val="tx1"/>
+            </a:solidFill>
+          </a:ln>
+        </p:spPr>
+        <p:style>
+          <a:lnRef idx="2">
+            <a:schemeClr val="accent3">
+              <a:shade val="50000"/>
+            </a:schemeClr>
+          </a:lnRef>
+          <a:fillRef idx="1">
+            <a:schemeClr val="accent3"/>
+          </a:fillRef>
+          <a:effectRef idx="0">
+            <a:schemeClr val="accent3"/>
+          </a:effectRef>
+          <a:fontRef idx="minor">
+            <a:schemeClr val="lt1"/>
+          </a:fontRef>
+        </p:style>
+        <p:txBody>
+          <a:bodyPr rtlCol="0" anchor="ctr"/>
+          <a:lstStyle/>
+          <a:p>
+            <a:pPr algn="ctr"/>
+            <a:endParaRPr lang="en-GB"/>
+          </a:p>
+        </p:txBody>
+      </p:sp>
+      <p:sp>
+        <p:nvSpPr>
+          <p:cNvPr id="4" name="Rectangle: Rounded Corners 3">
+            <a:extLst>
+              <a:ext uri="{FF2B5EF4-FFF2-40B4-BE49-F238E27FC236}">
+                <a16:creationId xmlns:a16="http://schemas.microsoft.com/office/drawing/2014/main" id="{A236E950-F5AB-4148-87FC-212AB691E5B1}"/>
+              </a:ext>
+            </a:extLst>
+          </p:cNvPr>
+          <p:cNvSpPr/>
+          <p:nvPr/>
+        </p:nvSpPr>
+        <p:spPr>
+          <a:xfrm>
+            <a:off x="4410241" y="168357"/>
+            <a:ext cx="2729834" cy="369332"/>
+          </a:xfrm>
+          <a:prstGeom prst="roundRect">
+            <a:avLst/>
+          </a:prstGeom>
+        </p:spPr>
+        <p:style>
+          <a:lnRef idx="2">
+            <a:schemeClr val="accent1">
+              <a:shade val="50000"/>
+            </a:schemeClr>
+          </a:lnRef>
+          <a:fillRef idx="1">
+            <a:schemeClr val="accent1"/>
+          </a:fillRef>
+          <a:effectRef idx="0">
+            <a:schemeClr val="accent1"/>
+          </a:effectRef>
+          <a:fontRef idx="minor">
+            <a:schemeClr val="lt1"/>
+          </a:fontRef>
+        </p:style>
+        <p:txBody>
+          <a:bodyPr rtlCol="0" anchor="ctr"/>
+          <a:lstStyle/>
+          <a:p>
+            <a:pPr algn="ctr"/>
+            <a:endParaRPr lang="en-GB"/>
+          </a:p>
+        </p:txBody>
+      </p:sp>
+      <p:sp>
+        <p:nvSpPr>
+          <p:cNvPr id="5" name="Rectangle: Rounded Corners 4">
+            <a:extLst>
+              <a:ext uri="{FF2B5EF4-FFF2-40B4-BE49-F238E27FC236}">
+                <a16:creationId xmlns:a16="http://schemas.microsoft.com/office/drawing/2014/main" id="{B7EB9378-BB27-4E46-AE7B-2128546BC518}"/>
+              </a:ext>
+            </a:extLst>
+          </p:cNvPr>
+          <p:cNvSpPr/>
+          <p:nvPr/>
+        </p:nvSpPr>
+        <p:spPr>
+          <a:xfrm>
+            <a:off x="171115" y="716983"/>
+            <a:ext cx="1989222" cy="433137"/>
+          </a:xfrm>
+          <a:prstGeom prst="roundRect">
+            <a:avLst/>
+          </a:prstGeom>
+        </p:spPr>
+        <p:style>
+          <a:lnRef idx="2">
+            <a:schemeClr val="accent1">
+              <a:shade val="50000"/>
+            </a:schemeClr>
+          </a:lnRef>
+          <a:fillRef idx="1">
+            <a:schemeClr val="accent1"/>
+          </a:fillRef>
+          <a:effectRef idx="0">
+            <a:schemeClr val="accent1"/>
+          </a:effectRef>
+          <a:fontRef idx="minor">
+            <a:schemeClr val="lt1"/>
+          </a:fontRef>
+        </p:style>
+        <p:txBody>
+          <a:bodyPr rtlCol="0" anchor="ctr"/>
+          <a:lstStyle/>
+          <a:p>
+            <a:pPr algn="ctr"/>
+            <a:endParaRPr lang="en-GB"/>
+          </a:p>
+        </p:txBody>
+      </p:sp>
+      <p:sp>
+        <p:nvSpPr>
+          <p:cNvPr id="6" name="Rectangle: Rounded Corners 5">
+            <a:extLst>
+              <a:ext uri="{FF2B5EF4-FFF2-40B4-BE49-F238E27FC236}">
+                <a16:creationId xmlns:a16="http://schemas.microsoft.com/office/drawing/2014/main" id="{6E2E2354-F343-48C9-824F-9C3A88781369}"/>
+              </a:ext>
+            </a:extLst>
+          </p:cNvPr>
+          <p:cNvSpPr/>
+          <p:nvPr/>
+        </p:nvSpPr>
+        <p:spPr>
+          <a:xfrm>
+            <a:off x="2557150" y="716983"/>
+            <a:ext cx="1989221" cy="433137"/>
+          </a:xfrm>
+          <a:prstGeom prst="roundRect">
+            <a:avLst/>
+          </a:prstGeom>
+        </p:spPr>
+        <p:style>
+          <a:lnRef idx="2">
+            <a:schemeClr val="accent1">
+              <a:shade val="50000"/>
+            </a:schemeClr>
+          </a:lnRef>
+          <a:fillRef idx="1">
+            <a:schemeClr val="accent1"/>
+          </a:fillRef>
+          <a:effectRef idx="0">
+            <a:schemeClr val="accent1"/>
+          </a:effectRef>
+          <a:fontRef idx="minor">
+            <a:schemeClr val="lt1"/>
+          </a:fontRef>
+        </p:style>
+        <p:txBody>
+          <a:bodyPr rtlCol="0" anchor="ctr"/>
+          <a:lstStyle/>
+          <a:p>
+            <a:pPr algn="ctr"/>
+            <a:endParaRPr lang="en-GB"/>
+          </a:p>
+        </p:txBody>
+      </p:sp>
+      <p:sp>
+        <p:nvSpPr>
+          <p:cNvPr id="7" name="Rectangle: Rounded Corners 6">
+            <a:extLst>
+              <a:ext uri="{FF2B5EF4-FFF2-40B4-BE49-F238E27FC236}">
+                <a16:creationId xmlns:a16="http://schemas.microsoft.com/office/drawing/2014/main" id="{3EF0D731-6D93-4506-B1CF-4E180E5BE4DC}"/>
+              </a:ext>
+            </a:extLst>
+          </p:cNvPr>
+          <p:cNvSpPr/>
+          <p:nvPr/>
+        </p:nvSpPr>
+        <p:spPr>
+          <a:xfrm>
+            <a:off x="7776394" y="721191"/>
+            <a:ext cx="4178967" cy="433137"/>
+          </a:xfrm>
+          <a:prstGeom prst="roundRect">
+            <a:avLst/>
+          </a:prstGeom>
+        </p:spPr>
+        <p:style>
+          <a:lnRef idx="2">
+            <a:schemeClr val="accent1">
+              <a:shade val="50000"/>
+            </a:schemeClr>
+          </a:lnRef>
+          <a:fillRef idx="1">
+            <a:schemeClr val="accent1"/>
+          </a:fillRef>
+          <a:effectRef idx="0">
+            <a:schemeClr val="accent1"/>
+          </a:effectRef>
+          <a:fontRef idx="minor">
+            <a:schemeClr val="lt1"/>
+          </a:fontRef>
+        </p:style>
+        <p:txBody>
+          <a:bodyPr rtlCol="0" anchor="ctr"/>
+          <a:lstStyle/>
+          <a:p>
+            <a:pPr algn="ctr"/>
+            <a:r>
+              <a:rPr lang="en-GB" dirty="0">
+                <a:solidFill>
+                  <a:schemeClr val="bg1"/>
+                </a:solidFill>
+              </a:rPr>
+              <a:t>Filter -- Week/Year</a:t>
+            </a:r>
+          </a:p>
+        </p:txBody>
+      </p:sp>
+      <p:cxnSp>
+        <p:nvCxnSpPr>
+          <p:cNvPr id="9" name="Straight Connector 8">
+            <a:extLst>
+              <a:ext uri="{FF2B5EF4-FFF2-40B4-BE49-F238E27FC236}">
+                <a16:creationId xmlns:a16="http://schemas.microsoft.com/office/drawing/2014/main" id="{24301F31-1E59-4409-9646-4B876A0D65E7}"/>
+              </a:ext>
+            </a:extLst>
+          </p:cNvPr>
+          <p:cNvCxnSpPr/>
+          <p:nvPr/>
+        </p:nvCxnSpPr>
+        <p:spPr>
+          <a:xfrm>
+            <a:off x="649705" y="1868906"/>
+            <a:ext cx="0" cy="2967789"/>
+          </a:xfrm>
+          <a:prstGeom prst="line">
+            <a:avLst/>
+          </a:prstGeom>
+        </p:spPr>
+        <p:style>
+          <a:lnRef idx="3">
+            <a:schemeClr val="dk1"/>
+          </a:lnRef>
+          <a:fillRef idx="0">
+            <a:schemeClr val="dk1"/>
+          </a:fillRef>
+          <a:effectRef idx="2">
+            <a:schemeClr val="dk1"/>
+          </a:effectRef>
+          <a:fontRef idx="minor">
+            <a:schemeClr val="tx1"/>
+          </a:fontRef>
+        </p:style>
+      </p:cxnSp>
+      <p:cxnSp>
+        <p:nvCxnSpPr>
+          <p:cNvPr id="10" name="Straight Connector 9">
+            <a:extLst>
+              <a:ext uri="{FF2B5EF4-FFF2-40B4-BE49-F238E27FC236}">
+                <a16:creationId xmlns:a16="http://schemas.microsoft.com/office/drawing/2014/main" id="{5064C61A-95F1-43F5-8068-E265F3226AC1}"/>
+              </a:ext>
+            </a:extLst>
+          </p:cNvPr>
+          <p:cNvCxnSpPr>
+            <a:cxnSpLocks/>
+          </p:cNvCxnSpPr>
+          <p:nvPr/>
+        </p:nvCxnSpPr>
+        <p:spPr>
+          <a:xfrm>
+            <a:off x="649705" y="4836695"/>
+            <a:ext cx="11211185" cy="0"/>
+          </a:xfrm>
+          <a:prstGeom prst="line">
+            <a:avLst/>
+          </a:prstGeom>
+        </p:spPr>
+        <p:style>
+          <a:lnRef idx="3">
+            <a:schemeClr val="dk1"/>
+          </a:lnRef>
+          <a:fillRef idx="0">
+            <a:schemeClr val="dk1"/>
+          </a:fillRef>
+          <a:effectRef idx="2">
+            <a:schemeClr val="dk1"/>
+          </a:effectRef>
+          <a:fontRef idx="minor">
+            <a:schemeClr val="tx1"/>
+          </a:fontRef>
+        </p:style>
+      </p:cxnSp>
+      <p:sp>
+        <p:nvSpPr>
+          <p:cNvPr id="14" name="TextBox 13">
+            <a:extLst>
+              <a:ext uri="{FF2B5EF4-FFF2-40B4-BE49-F238E27FC236}">
+                <a16:creationId xmlns:a16="http://schemas.microsoft.com/office/drawing/2014/main" id="{9F4EF6A3-102A-4FE1-BB75-100D60DE4F2F}"/>
+              </a:ext>
+            </a:extLst>
+          </p:cNvPr>
+          <p:cNvSpPr txBox="1"/>
+          <p:nvPr/>
+        </p:nvSpPr>
+        <p:spPr>
+          <a:xfrm>
+            <a:off x="3795292" y="5189519"/>
+            <a:ext cx="1041387" cy="369332"/>
+          </a:xfrm>
+          <a:prstGeom prst="rect">
+            <a:avLst/>
+          </a:prstGeom>
+          <a:noFill/>
+        </p:spPr>
+        <p:txBody>
+          <a:bodyPr wrap="square" rtlCol="0">
+            <a:spAutoFit/>
+          </a:bodyPr>
+          <a:lstStyle/>
+          <a:p>
+            <a:pPr algn="ctr"/>
+            <a:r>
+              <a:rPr lang="en-GB" dirty="0"/>
+              <a:t>Speaker</a:t>
+            </a:r>
+          </a:p>
+        </p:txBody>
+      </p:sp>
+      <p:sp>
+        <p:nvSpPr>
+          <p:cNvPr id="15" name="TextBox 14">
+            <a:extLst>
+              <a:ext uri="{FF2B5EF4-FFF2-40B4-BE49-F238E27FC236}">
+                <a16:creationId xmlns:a16="http://schemas.microsoft.com/office/drawing/2014/main" id="{52B11C6C-70A3-4961-80A0-CC8CC4A1AF4F}"/>
+              </a:ext>
+            </a:extLst>
+          </p:cNvPr>
+          <p:cNvSpPr txBox="1"/>
+          <p:nvPr/>
+        </p:nvSpPr>
+        <p:spPr>
+          <a:xfrm>
+            <a:off x="5155534" y="5188879"/>
+            <a:ext cx="862119" cy="369332"/>
+          </a:xfrm>
+          <a:prstGeom prst="rect">
+            <a:avLst/>
+          </a:prstGeom>
+          <a:noFill/>
+        </p:spPr>
+        <p:txBody>
+          <a:bodyPr wrap="square" rtlCol="0">
+            <a:spAutoFit/>
+          </a:bodyPr>
+          <a:lstStyle/>
+          <a:p>
+            <a:pPr algn="ctr"/>
+            <a:r>
+              <a:rPr lang="en-GB" dirty="0"/>
+              <a:t>Topic</a:t>
+            </a:r>
+          </a:p>
+        </p:txBody>
+      </p:sp>
+      <p:sp>
+        <p:nvSpPr>
+          <p:cNvPr id="16" name="TextBox 15">
+            <a:extLst>
+              <a:ext uri="{FF2B5EF4-FFF2-40B4-BE49-F238E27FC236}">
+                <a16:creationId xmlns:a16="http://schemas.microsoft.com/office/drawing/2014/main" id="{483E2797-2113-4710-B563-C1D6702D6D0B}"/>
+              </a:ext>
+            </a:extLst>
+          </p:cNvPr>
+          <p:cNvSpPr txBox="1"/>
+          <p:nvPr/>
+        </p:nvSpPr>
+        <p:spPr>
+          <a:xfrm>
+            <a:off x="8412194" y="5196559"/>
+            <a:ext cx="3102023" cy="338554"/>
+          </a:xfrm>
+          <a:prstGeom prst="rect">
+            <a:avLst/>
+          </a:prstGeom>
+          <a:noFill/>
+        </p:spPr>
+        <p:txBody>
+          <a:bodyPr wrap="square" rtlCol="0">
+            <a:spAutoFit/>
+          </a:bodyPr>
+          <a:lstStyle/>
+          <a:p>
+            <a:r>
+              <a:rPr lang="en-GB" sz="1600" dirty="0"/>
+              <a:t>Source (date + location  + debate)</a:t>
+            </a:r>
+          </a:p>
+        </p:txBody>
+      </p:sp>
+      <p:sp>
+        <p:nvSpPr>
+          <p:cNvPr id="17" name="TextBox 16">
+            <a:extLst>
+              <a:ext uri="{FF2B5EF4-FFF2-40B4-BE49-F238E27FC236}">
+                <a16:creationId xmlns:a16="http://schemas.microsoft.com/office/drawing/2014/main" id="{81C53452-534A-4907-8243-DF51260643EF}"/>
+              </a:ext>
+            </a:extLst>
+          </p:cNvPr>
+          <p:cNvSpPr txBox="1"/>
+          <p:nvPr/>
+        </p:nvSpPr>
+        <p:spPr>
+          <a:xfrm>
+            <a:off x="975008" y="5188879"/>
+            <a:ext cx="3379994" cy="369332"/>
+          </a:xfrm>
+          <a:prstGeom prst="rect">
+            <a:avLst/>
+          </a:prstGeom>
+          <a:noFill/>
+        </p:spPr>
+        <p:txBody>
+          <a:bodyPr wrap="square" rtlCol="0">
+            <a:spAutoFit/>
+          </a:bodyPr>
+          <a:lstStyle/>
+          <a:p>
+            <a:pPr algn="ctr"/>
+            <a:r>
+              <a:rPr lang="en-GB" dirty="0"/>
+              <a:t>Context</a:t>
+            </a:r>
+          </a:p>
+        </p:txBody>
+      </p:sp>
+      <p:sp>
+        <p:nvSpPr>
+          <p:cNvPr id="18" name="TextBox 17">
+            <a:extLst>
+              <a:ext uri="{FF2B5EF4-FFF2-40B4-BE49-F238E27FC236}">
+                <a16:creationId xmlns:a16="http://schemas.microsoft.com/office/drawing/2014/main" id="{4121A826-1AC6-4A57-BD37-C349AE428423}"/>
+              </a:ext>
+            </a:extLst>
+          </p:cNvPr>
+          <p:cNvSpPr txBox="1"/>
+          <p:nvPr/>
+        </p:nvSpPr>
+        <p:spPr>
+          <a:xfrm>
+            <a:off x="483507" y="5212956"/>
+            <a:ext cx="392786" cy="377719"/>
+          </a:xfrm>
+          <a:prstGeom prst="rect">
+            <a:avLst/>
+          </a:prstGeom>
+          <a:noFill/>
+        </p:spPr>
+        <p:txBody>
+          <a:bodyPr wrap="square" rtlCol="0">
+            <a:spAutoFit/>
+          </a:bodyPr>
+          <a:lstStyle/>
+          <a:p>
+            <a:r>
+              <a:rPr lang="en-GB" dirty="0"/>
+              <a:t>id</a:t>
+            </a:r>
+          </a:p>
+        </p:txBody>
+      </p:sp>
+      <p:sp>
+        <p:nvSpPr>
+          <p:cNvPr id="19" name="Rectangle 18">
+            <a:extLst>
+              <a:ext uri="{FF2B5EF4-FFF2-40B4-BE49-F238E27FC236}">
+                <a16:creationId xmlns:a16="http://schemas.microsoft.com/office/drawing/2014/main" id="{EE615377-04FA-4909-B516-5C3691B69A6F}"/>
+              </a:ext>
+            </a:extLst>
+          </p:cNvPr>
+          <p:cNvSpPr/>
+          <p:nvPr/>
+        </p:nvSpPr>
+        <p:spPr>
+          <a:xfrm>
+            <a:off x="11626426" y="5846761"/>
+            <a:ext cx="201430" cy="489284"/>
+          </a:xfrm>
+          <a:prstGeom prst="rect">
+            <a:avLst/>
+          </a:prstGeom>
+        </p:spPr>
+        <p:style>
+          <a:lnRef idx="2">
+            <a:schemeClr val="accent3">
+              <a:shade val="50000"/>
+            </a:schemeClr>
+          </a:lnRef>
+          <a:fillRef idx="1">
+            <a:schemeClr val="accent3"/>
+          </a:fillRef>
+          <a:effectRef idx="0">
+            <a:schemeClr val="accent3"/>
+          </a:effectRef>
+          <a:fontRef idx="minor">
+            <a:schemeClr val="lt1"/>
+          </a:fontRef>
+        </p:style>
+        <p:txBody>
+          <a:bodyPr rtlCol="0" anchor="ctr"/>
+          <a:lstStyle/>
+          <a:p>
+            <a:pPr algn="ctr"/>
+            <a:endParaRPr lang="en-GB"/>
+          </a:p>
+        </p:txBody>
+      </p:sp>
+      <p:sp>
+        <p:nvSpPr>
+          <p:cNvPr id="20" name="Isosceles Triangle 19">
+            <a:extLst>
+              <a:ext uri="{FF2B5EF4-FFF2-40B4-BE49-F238E27FC236}">
+                <a16:creationId xmlns:a16="http://schemas.microsoft.com/office/drawing/2014/main" id="{02222BD2-2A26-40F5-B2E4-0E343174C9E7}"/>
+              </a:ext>
+            </a:extLst>
+          </p:cNvPr>
+          <p:cNvSpPr/>
+          <p:nvPr/>
+        </p:nvSpPr>
+        <p:spPr>
+          <a:xfrm>
+            <a:off x="11593094" y="5598701"/>
+            <a:ext cx="267796" cy="192498"/>
+          </a:xfrm>
+          <a:prstGeom prst="triangle">
+            <a:avLst/>
+          </a:prstGeom>
+        </p:spPr>
+        <p:style>
+          <a:lnRef idx="2">
+            <a:schemeClr val="accent3">
+              <a:shade val="50000"/>
+            </a:schemeClr>
+          </a:lnRef>
+          <a:fillRef idx="1">
+            <a:schemeClr val="accent3"/>
+          </a:fillRef>
+          <a:effectRef idx="0">
+            <a:schemeClr val="accent3"/>
+          </a:effectRef>
+          <a:fontRef idx="minor">
+            <a:schemeClr val="lt1"/>
+          </a:fontRef>
+        </p:style>
+        <p:txBody>
+          <a:bodyPr rtlCol="0" anchor="ctr"/>
+          <a:lstStyle/>
+          <a:p>
+            <a:pPr algn="ctr"/>
+            <a:endParaRPr lang="en-GB"/>
+          </a:p>
+        </p:txBody>
+      </p:sp>
+      <p:sp>
+        <p:nvSpPr>
+          <p:cNvPr id="21" name="Isosceles Triangle 20">
+            <a:extLst>
+              <a:ext uri="{FF2B5EF4-FFF2-40B4-BE49-F238E27FC236}">
+                <a16:creationId xmlns:a16="http://schemas.microsoft.com/office/drawing/2014/main" id="{C9919F5B-F884-4D88-ABDB-A04F6E53ABC0}"/>
+              </a:ext>
+            </a:extLst>
+          </p:cNvPr>
+          <p:cNvSpPr/>
+          <p:nvPr/>
+        </p:nvSpPr>
+        <p:spPr>
+          <a:xfrm rot="10800000">
+            <a:off x="11593094" y="6391609"/>
+            <a:ext cx="267796" cy="192498"/>
+          </a:xfrm>
+          <a:prstGeom prst="triangle">
+            <a:avLst/>
+          </a:prstGeom>
+        </p:spPr>
+        <p:style>
+          <a:lnRef idx="2">
+            <a:schemeClr val="accent3">
+              <a:shade val="50000"/>
+            </a:schemeClr>
+          </a:lnRef>
+          <a:fillRef idx="1">
+            <a:schemeClr val="accent3"/>
+          </a:fillRef>
+          <a:effectRef idx="0">
+            <a:schemeClr val="accent3"/>
+          </a:effectRef>
+          <a:fontRef idx="minor">
+            <a:schemeClr val="lt1"/>
+          </a:fontRef>
+        </p:style>
+        <p:txBody>
+          <a:bodyPr rtlCol="0" anchor="ctr"/>
+          <a:lstStyle/>
+          <a:p>
+            <a:pPr algn="ctr"/>
+            <a:endParaRPr lang="en-GB"/>
+          </a:p>
+        </p:txBody>
+      </p:sp>
+      <p:cxnSp>
+        <p:nvCxnSpPr>
+          <p:cNvPr id="24" name="Straight Connector 23">
+            <a:extLst>
+              <a:ext uri="{FF2B5EF4-FFF2-40B4-BE49-F238E27FC236}">
+                <a16:creationId xmlns:a16="http://schemas.microsoft.com/office/drawing/2014/main" id="{EF718576-2DCE-48BB-9882-8221CDF61BA9}"/>
+              </a:ext>
+            </a:extLst>
+          </p:cNvPr>
+          <p:cNvCxnSpPr>
+            <a:cxnSpLocks/>
+          </p:cNvCxnSpPr>
+          <p:nvPr/>
+        </p:nvCxnSpPr>
+        <p:spPr>
+          <a:xfrm>
+            <a:off x="436175" y="5565520"/>
+            <a:ext cx="10941684" cy="8385"/>
+          </a:xfrm>
+          <a:prstGeom prst="line">
+            <a:avLst/>
+          </a:prstGeom>
+        </p:spPr>
+        <p:style>
+          <a:lnRef idx="1">
+            <a:schemeClr val="dk1"/>
+          </a:lnRef>
+          <a:fillRef idx="0">
+            <a:schemeClr val="dk1"/>
+          </a:fillRef>
+          <a:effectRef idx="0">
+            <a:schemeClr val="dk1"/>
+          </a:effectRef>
+          <a:fontRef idx="minor">
+            <a:schemeClr val="tx1"/>
+          </a:fontRef>
+        </p:style>
+      </p:cxnSp>
+      <p:sp>
+        <p:nvSpPr>
+          <p:cNvPr id="25" name="TextBox 24">
+            <a:extLst>
+              <a:ext uri="{FF2B5EF4-FFF2-40B4-BE49-F238E27FC236}">
+                <a16:creationId xmlns:a16="http://schemas.microsoft.com/office/drawing/2014/main" id="{CE8F96B1-EFD7-4B10-A091-E9749DA5F96D}"/>
+              </a:ext>
+            </a:extLst>
+          </p:cNvPr>
+          <p:cNvSpPr txBox="1"/>
+          <p:nvPr/>
+        </p:nvSpPr>
+        <p:spPr>
+          <a:xfrm>
+            <a:off x="4580022" y="159783"/>
+            <a:ext cx="2271809" cy="369332"/>
+          </a:xfrm>
+          <a:prstGeom prst="rect">
+            <a:avLst/>
+          </a:prstGeom>
+          <a:noFill/>
+        </p:spPr>
+        <p:txBody>
+          <a:bodyPr wrap="square" rtlCol="0">
+            <a:spAutoFit/>
+          </a:bodyPr>
+          <a:lstStyle/>
+          <a:p>
+            <a:pPr algn="ctr"/>
+            <a:r>
+              <a:rPr lang="en-GB" dirty="0">
+                <a:solidFill>
+                  <a:schemeClr val="bg1"/>
+                </a:solidFill>
+              </a:rPr>
+              <a:t>Heading</a:t>
+            </a:r>
+          </a:p>
+        </p:txBody>
+      </p:sp>
+      <p:sp>
+        <p:nvSpPr>
+          <p:cNvPr id="26" name="TextBox 25">
+            <a:extLst>
+              <a:ext uri="{FF2B5EF4-FFF2-40B4-BE49-F238E27FC236}">
+                <a16:creationId xmlns:a16="http://schemas.microsoft.com/office/drawing/2014/main" id="{F40E6EE2-ECED-4D0F-BAFB-CB5D6D64F278}"/>
+              </a:ext>
+            </a:extLst>
+          </p:cNvPr>
+          <p:cNvSpPr txBox="1"/>
+          <p:nvPr/>
+        </p:nvSpPr>
+        <p:spPr>
+          <a:xfrm>
+            <a:off x="371640" y="733024"/>
+            <a:ext cx="1655460" cy="369332"/>
+          </a:xfrm>
+          <a:prstGeom prst="rect">
+            <a:avLst/>
+          </a:prstGeom>
+          <a:noFill/>
+        </p:spPr>
+        <p:txBody>
+          <a:bodyPr wrap="square" rtlCol="0">
+            <a:spAutoFit/>
+          </a:bodyPr>
+          <a:lstStyle/>
+          <a:p>
+            <a:pPr algn="ctr"/>
+            <a:r>
+              <a:rPr lang="en-GB" dirty="0">
+                <a:solidFill>
+                  <a:schemeClr val="bg1"/>
+                </a:solidFill>
+              </a:rPr>
+              <a:t>Filter -- Topic</a:t>
+            </a:r>
+          </a:p>
+        </p:txBody>
+      </p:sp>
+      <p:sp>
+        <p:nvSpPr>
+          <p:cNvPr id="27" name="TextBox 26">
+            <a:extLst>
+              <a:ext uri="{FF2B5EF4-FFF2-40B4-BE49-F238E27FC236}">
+                <a16:creationId xmlns:a16="http://schemas.microsoft.com/office/drawing/2014/main" id="{7E478DA1-0D05-4468-ACA7-3F21FF065C97}"/>
+              </a:ext>
+            </a:extLst>
+          </p:cNvPr>
+          <p:cNvSpPr txBox="1"/>
+          <p:nvPr/>
+        </p:nvSpPr>
+        <p:spPr>
+          <a:xfrm>
+            <a:off x="2534940" y="682806"/>
+            <a:ext cx="1989221" cy="461665"/>
+          </a:xfrm>
+          <a:prstGeom prst="rect">
+            <a:avLst/>
+          </a:prstGeom>
+          <a:noFill/>
+        </p:spPr>
+        <p:txBody>
+          <a:bodyPr wrap="square" rtlCol="0">
+            <a:spAutoFit/>
+          </a:bodyPr>
+          <a:lstStyle/>
+          <a:p>
+            <a:pPr algn="ctr"/>
+            <a:r>
+              <a:rPr lang="en-GB" sz="1200" dirty="0">
+                <a:solidFill>
+                  <a:schemeClr val="bg1"/>
+                </a:solidFill>
+              </a:rPr>
+              <a:t>Filter – Parliament (UK/NI/SCO/WAL)</a:t>
+            </a:r>
+          </a:p>
+        </p:txBody>
+      </p:sp>
+      <p:sp>
+        <p:nvSpPr>
+          <p:cNvPr id="30" name="Rectangle 29">
+            <a:extLst>
+              <a:ext uri="{FF2B5EF4-FFF2-40B4-BE49-F238E27FC236}">
+                <a16:creationId xmlns:a16="http://schemas.microsoft.com/office/drawing/2014/main" id="{4796394A-A7EF-40EE-9205-6FFA8B6D1ED8}"/>
+              </a:ext>
+            </a:extLst>
+          </p:cNvPr>
+          <p:cNvSpPr/>
+          <p:nvPr/>
+        </p:nvSpPr>
+        <p:spPr>
+          <a:xfrm>
+            <a:off x="760400" y="3891227"/>
+            <a:ext cx="201832" cy="940771"/>
+          </a:xfrm>
+          <a:prstGeom prst="rect">
+            <a:avLst/>
+          </a:prstGeom>
+        </p:spPr>
+        <p:style>
+          <a:lnRef idx="2">
+            <a:schemeClr val="accent3">
+              <a:shade val="50000"/>
+            </a:schemeClr>
+          </a:lnRef>
+          <a:fillRef idx="1">
+            <a:schemeClr val="accent3"/>
+          </a:fillRef>
+          <a:effectRef idx="0">
+            <a:schemeClr val="accent3"/>
+          </a:effectRef>
+          <a:fontRef idx="minor">
+            <a:schemeClr val="lt1"/>
+          </a:fontRef>
+        </p:style>
+        <p:txBody>
+          <a:bodyPr rtlCol="0" anchor="ctr"/>
+          <a:lstStyle/>
+          <a:p>
+            <a:pPr algn="ctr"/>
+            <a:endParaRPr lang="en-GB"/>
+          </a:p>
+        </p:txBody>
+      </p:sp>
+      <p:sp>
+        <p:nvSpPr>
+          <p:cNvPr id="54" name="TextBox 53">
+            <a:extLst>
+              <a:ext uri="{FF2B5EF4-FFF2-40B4-BE49-F238E27FC236}">
+                <a16:creationId xmlns:a16="http://schemas.microsoft.com/office/drawing/2014/main" id="{788348DF-F23C-4373-92AB-C3E6734809EE}"/>
+              </a:ext>
+            </a:extLst>
+          </p:cNvPr>
+          <p:cNvSpPr txBox="1"/>
+          <p:nvPr/>
+        </p:nvSpPr>
+        <p:spPr>
+          <a:xfrm>
+            <a:off x="713501" y="4850926"/>
+            <a:ext cx="1053494" cy="307777"/>
+          </a:xfrm>
+          <a:prstGeom prst="rect">
+            <a:avLst/>
+          </a:prstGeom>
+          <a:noFill/>
+        </p:spPr>
+        <p:txBody>
+          <a:bodyPr wrap="none" rtlCol="0">
+            <a:spAutoFit/>
+          </a:bodyPr>
+          <a:lstStyle/>
+          <a:p>
+            <a:r>
+              <a:rPr lang="en-GB" sz="1400" dirty="0"/>
+              <a:t>04/01/2016</a:t>
+            </a:r>
+          </a:p>
+        </p:txBody>
+      </p:sp>
+      <p:sp>
+        <p:nvSpPr>
+          <p:cNvPr id="55" name="TextBox 54">
+            <a:extLst>
+              <a:ext uri="{FF2B5EF4-FFF2-40B4-BE49-F238E27FC236}">
+                <a16:creationId xmlns:a16="http://schemas.microsoft.com/office/drawing/2014/main" id="{549F7838-BA58-41D5-AFD5-A6ABC76AFF4A}"/>
+              </a:ext>
+            </a:extLst>
+          </p:cNvPr>
+          <p:cNvSpPr txBox="1"/>
+          <p:nvPr/>
+        </p:nvSpPr>
+        <p:spPr>
+          <a:xfrm>
+            <a:off x="2139915" y="4858624"/>
+            <a:ext cx="1053494" cy="307777"/>
+          </a:xfrm>
+          <a:prstGeom prst="rect">
+            <a:avLst/>
+          </a:prstGeom>
+          <a:noFill/>
+        </p:spPr>
+        <p:txBody>
+          <a:bodyPr wrap="none" rtlCol="0">
+            <a:spAutoFit/>
+          </a:bodyPr>
+          <a:lstStyle/>
+          <a:p>
+            <a:r>
+              <a:rPr lang="en-GB" sz="1400" dirty="0"/>
+              <a:t>11/01/2016</a:t>
+            </a:r>
+          </a:p>
+        </p:txBody>
+      </p:sp>
+      <p:sp>
+        <p:nvSpPr>
+          <p:cNvPr id="56" name="TextBox 55">
+            <a:extLst>
+              <a:ext uri="{FF2B5EF4-FFF2-40B4-BE49-F238E27FC236}">
+                <a16:creationId xmlns:a16="http://schemas.microsoft.com/office/drawing/2014/main" id="{B4175D74-0237-463E-9C92-BF1E9C952B97}"/>
+              </a:ext>
+            </a:extLst>
+          </p:cNvPr>
+          <p:cNvSpPr txBox="1"/>
+          <p:nvPr/>
+        </p:nvSpPr>
+        <p:spPr>
+          <a:xfrm>
+            <a:off x="3566330" y="4857774"/>
+            <a:ext cx="1053494" cy="307777"/>
+          </a:xfrm>
+          <a:prstGeom prst="rect">
+            <a:avLst/>
+          </a:prstGeom>
+          <a:noFill/>
+        </p:spPr>
+        <p:txBody>
+          <a:bodyPr wrap="none" rtlCol="0">
+            <a:spAutoFit/>
+          </a:bodyPr>
+          <a:lstStyle/>
+          <a:p>
+            <a:r>
+              <a:rPr lang="en-GB" sz="1400" dirty="0"/>
+              <a:t>18/01/2016</a:t>
+            </a:r>
+          </a:p>
+        </p:txBody>
+      </p:sp>
+      <p:sp>
+        <p:nvSpPr>
+          <p:cNvPr id="57" name="TextBox 56">
+            <a:extLst>
+              <a:ext uri="{FF2B5EF4-FFF2-40B4-BE49-F238E27FC236}">
+                <a16:creationId xmlns:a16="http://schemas.microsoft.com/office/drawing/2014/main" id="{A48F607B-5C55-4994-A6DA-A7B0D9D9AD18}"/>
+              </a:ext>
+            </a:extLst>
+          </p:cNvPr>
+          <p:cNvSpPr txBox="1"/>
+          <p:nvPr/>
+        </p:nvSpPr>
+        <p:spPr>
+          <a:xfrm>
+            <a:off x="4992744" y="4850926"/>
+            <a:ext cx="1053494" cy="307777"/>
+          </a:xfrm>
+          <a:prstGeom prst="rect">
+            <a:avLst/>
+          </a:prstGeom>
+          <a:noFill/>
+        </p:spPr>
+        <p:txBody>
+          <a:bodyPr wrap="none" rtlCol="0">
+            <a:spAutoFit/>
+          </a:bodyPr>
+          <a:lstStyle/>
+          <a:p>
+            <a:r>
+              <a:rPr lang="en-GB" sz="1400" dirty="0"/>
+              <a:t>25/01/2016</a:t>
+            </a:r>
+          </a:p>
+        </p:txBody>
+      </p:sp>
+      <p:sp>
+        <p:nvSpPr>
+          <p:cNvPr id="58" name="TextBox 57">
+            <a:extLst>
+              <a:ext uri="{FF2B5EF4-FFF2-40B4-BE49-F238E27FC236}">
+                <a16:creationId xmlns:a16="http://schemas.microsoft.com/office/drawing/2014/main" id="{90F37AE7-79BA-4055-8118-624AA123FC5C}"/>
+              </a:ext>
+            </a:extLst>
+          </p:cNvPr>
+          <p:cNvSpPr txBox="1"/>
+          <p:nvPr/>
+        </p:nvSpPr>
+        <p:spPr>
+          <a:xfrm>
+            <a:off x="6443548" y="4866204"/>
+            <a:ext cx="1053494" cy="307777"/>
+          </a:xfrm>
+          <a:prstGeom prst="rect">
+            <a:avLst/>
+          </a:prstGeom>
+          <a:noFill/>
+        </p:spPr>
+        <p:txBody>
+          <a:bodyPr wrap="none" rtlCol="0">
+            <a:spAutoFit/>
+          </a:bodyPr>
+          <a:lstStyle/>
+          <a:p>
+            <a:r>
+              <a:rPr lang="en-GB" sz="1400" dirty="0"/>
+              <a:t>01/02/2016</a:t>
+            </a:r>
+          </a:p>
+        </p:txBody>
+      </p:sp>
+      <p:sp>
+        <p:nvSpPr>
+          <p:cNvPr id="59" name="TextBox 58">
+            <a:extLst>
+              <a:ext uri="{FF2B5EF4-FFF2-40B4-BE49-F238E27FC236}">
+                <a16:creationId xmlns:a16="http://schemas.microsoft.com/office/drawing/2014/main" id="{CD320D13-54CA-4166-81C8-430130D7AC26}"/>
+              </a:ext>
+            </a:extLst>
+          </p:cNvPr>
+          <p:cNvSpPr txBox="1"/>
+          <p:nvPr/>
+        </p:nvSpPr>
+        <p:spPr>
+          <a:xfrm>
+            <a:off x="7869962" y="4857774"/>
+            <a:ext cx="1053494" cy="307777"/>
+          </a:xfrm>
+          <a:prstGeom prst="rect">
+            <a:avLst/>
+          </a:prstGeom>
+          <a:noFill/>
+        </p:spPr>
+        <p:txBody>
+          <a:bodyPr wrap="none" rtlCol="0">
+            <a:spAutoFit/>
+          </a:bodyPr>
+          <a:lstStyle/>
+          <a:p>
+            <a:r>
+              <a:rPr lang="en-GB" sz="1400" dirty="0"/>
+              <a:t>08/02/2016</a:t>
+            </a:r>
+          </a:p>
+        </p:txBody>
+      </p:sp>
+      <p:sp>
+        <p:nvSpPr>
+          <p:cNvPr id="60" name="TextBox 59">
+            <a:extLst>
+              <a:ext uri="{FF2B5EF4-FFF2-40B4-BE49-F238E27FC236}">
+                <a16:creationId xmlns:a16="http://schemas.microsoft.com/office/drawing/2014/main" id="{699EB5F0-A289-4DE6-B7F7-318FCE2B97DE}"/>
+              </a:ext>
+            </a:extLst>
+          </p:cNvPr>
+          <p:cNvSpPr txBox="1"/>
+          <p:nvPr/>
+        </p:nvSpPr>
+        <p:spPr>
+          <a:xfrm>
+            <a:off x="9383264" y="4859384"/>
+            <a:ext cx="1053494" cy="307777"/>
+          </a:xfrm>
+          <a:prstGeom prst="rect">
+            <a:avLst/>
+          </a:prstGeom>
+          <a:noFill/>
+        </p:spPr>
+        <p:txBody>
+          <a:bodyPr wrap="none" rtlCol="0">
+            <a:spAutoFit/>
+          </a:bodyPr>
+          <a:lstStyle/>
+          <a:p>
+            <a:r>
+              <a:rPr lang="en-GB" sz="1400" dirty="0"/>
+              <a:t>15/02/2016</a:t>
+            </a:r>
+          </a:p>
+        </p:txBody>
+      </p:sp>
+      <p:sp>
+        <p:nvSpPr>
+          <p:cNvPr id="61" name="TextBox 60">
+            <a:extLst>
+              <a:ext uri="{FF2B5EF4-FFF2-40B4-BE49-F238E27FC236}">
+                <a16:creationId xmlns:a16="http://schemas.microsoft.com/office/drawing/2014/main" id="{07B7E7BA-D942-419B-83B0-AE610256E8DF}"/>
+              </a:ext>
+            </a:extLst>
+          </p:cNvPr>
+          <p:cNvSpPr txBox="1"/>
+          <p:nvPr/>
+        </p:nvSpPr>
+        <p:spPr>
+          <a:xfrm>
+            <a:off x="10745615" y="4866203"/>
+            <a:ext cx="1053494" cy="307777"/>
+          </a:xfrm>
+          <a:prstGeom prst="rect">
+            <a:avLst/>
+          </a:prstGeom>
+          <a:noFill/>
+        </p:spPr>
+        <p:txBody>
+          <a:bodyPr wrap="none" rtlCol="0">
+            <a:spAutoFit/>
+          </a:bodyPr>
+          <a:lstStyle/>
+          <a:p>
+            <a:r>
+              <a:rPr lang="en-GB" sz="1400" dirty="0"/>
+              <a:t>22/02/2016</a:t>
+            </a:r>
+          </a:p>
+        </p:txBody>
+      </p:sp>
+      <p:sp>
+        <p:nvSpPr>
+          <p:cNvPr id="62" name="TextBox 61">
+            <a:extLst>
+              <a:ext uri="{FF2B5EF4-FFF2-40B4-BE49-F238E27FC236}">
+                <a16:creationId xmlns:a16="http://schemas.microsoft.com/office/drawing/2014/main" id="{2BFAB897-B98F-4BA9-B865-C4599A1769AC}"/>
+              </a:ext>
+            </a:extLst>
+          </p:cNvPr>
+          <p:cNvSpPr txBox="1"/>
+          <p:nvPr/>
+        </p:nvSpPr>
+        <p:spPr>
+          <a:xfrm rot="16200000">
+            <a:off x="48913" y="3244334"/>
+            <a:ext cx="748410" cy="369332"/>
+          </a:xfrm>
+          <a:prstGeom prst="rect">
+            <a:avLst/>
+          </a:prstGeom>
+          <a:noFill/>
+        </p:spPr>
+        <p:txBody>
+          <a:bodyPr wrap="none" rtlCol="0">
+            <a:spAutoFit/>
+          </a:bodyPr>
+          <a:lstStyle/>
+          <a:p>
+            <a:r>
+              <a:rPr lang="en-GB" dirty="0"/>
+              <a:t>Count</a:t>
+            </a:r>
+          </a:p>
+        </p:txBody>
+      </p:sp>
+      <p:sp>
+        <p:nvSpPr>
+          <p:cNvPr id="63" name="TextBox 62">
+            <a:extLst>
+              <a:ext uri="{FF2B5EF4-FFF2-40B4-BE49-F238E27FC236}">
+                <a16:creationId xmlns:a16="http://schemas.microsoft.com/office/drawing/2014/main" id="{71044900-E150-4B9D-A5B4-E5FB60286992}"/>
+              </a:ext>
+            </a:extLst>
+          </p:cNvPr>
+          <p:cNvSpPr txBox="1"/>
+          <p:nvPr/>
+        </p:nvSpPr>
+        <p:spPr>
+          <a:xfrm>
+            <a:off x="980358" y="2163915"/>
+            <a:ext cx="418704" cy="369332"/>
+          </a:xfrm>
+          <a:prstGeom prst="rect">
+            <a:avLst/>
+          </a:prstGeom>
+          <a:noFill/>
+        </p:spPr>
+        <p:txBody>
+          <a:bodyPr wrap="none" rtlCol="0">
+            <a:spAutoFit/>
+          </a:bodyPr>
+          <a:lstStyle/>
+          <a:p>
+            <a:r>
+              <a:rPr lang="en-GB" dirty="0"/>
+              <a:t>15</a:t>
+            </a:r>
+          </a:p>
+        </p:txBody>
+      </p:sp>
+      <p:sp>
+        <p:nvSpPr>
+          <p:cNvPr id="64" name="TextBox 63">
+            <a:extLst>
+              <a:ext uri="{FF2B5EF4-FFF2-40B4-BE49-F238E27FC236}">
+                <a16:creationId xmlns:a16="http://schemas.microsoft.com/office/drawing/2014/main" id="{03C4FB18-785F-4B3F-B03F-F23C0EAC336E}"/>
+              </a:ext>
+            </a:extLst>
+          </p:cNvPr>
+          <p:cNvSpPr txBox="1"/>
+          <p:nvPr/>
+        </p:nvSpPr>
+        <p:spPr>
+          <a:xfrm>
+            <a:off x="2340641" y="2153988"/>
+            <a:ext cx="418704" cy="369332"/>
+          </a:xfrm>
+          <a:prstGeom prst="rect">
+            <a:avLst/>
+          </a:prstGeom>
+          <a:noFill/>
+        </p:spPr>
+        <p:txBody>
+          <a:bodyPr wrap="none" rtlCol="0">
+            <a:spAutoFit/>
+          </a:bodyPr>
+          <a:lstStyle/>
+          <a:p>
+            <a:r>
+              <a:rPr lang="en-GB" dirty="0"/>
+              <a:t>10</a:t>
+            </a:r>
+          </a:p>
+        </p:txBody>
+      </p:sp>
+      <p:sp>
+        <p:nvSpPr>
+          <p:cNvPr id="65" name="TextBox 64">
+            <a:extLst>
+              <a:ext uri="{FF2B5EF4-FFF2-40B4-BE49-F238E27FC236}">
+                <a16:creationId xmlns:a16="http://schemas.microsoft.com/office/drawing/2014/main" id="{D64C602C-7ABF-45DD-81C9-E6B26F506B7D}"/>
+              </a:ext>
+            </a:extLst>
+          </p:cNvPr>
+          <p:cNvSpPr txBox="1"/>
+          <p:nvPr/>
+        </p:nvSpPr>
+        <p:spPr>
+          <a:xfrm>
+            <a:off x="3828789" y="2167880"/>
+            <a:ext cx="301686" cy="369332"/>
+          </a:xfrm>
+          <a:prstGeom prst="rect">
+            <a:avLst/>
+          </a:prstGeom>
+          <a:noFill/>
+        </p:spPr>
+        <p:txBody>
+          <a:bodyPr wrap="none" rtlCol="0">
+            <a:spAutoFit/>
+          </a:bodyPr>
+          <a:lstStyle/>
+          <a:p>
+            <a:r>
+              <a:rPr lang="en-GB" dirty="0"/>
+              <a:t>9</a:t>
+            </a:r>
+          </a:p>
+        </p:txBody>
+      </p:sp>
+      <p:sp>
+        <p:nvSpPr>
+          <p:cNvPr id="66" name="TextBox 65">
+            <a:extLst>
+              <a:ext uri="{FF2B5EF4-FFF2-40B4-BE49-F238E27FC236}">
+                <a16:creationId xmlns:a16="http://schemas.microsoft.com/office/drawing/2014/main" id="{D380DD65-F467-490F-B8C4-B382EAAA44A7}"/>
+              </a:ext>
+            </a:extLst>
+          </p:cNvPr>
+          <p:cNvSpPr txBox="1"/>
+          <p:nvPr/>
+        </p:nvSpPr>
+        <p:spPr>
+          <a:xfrm>
+            <a:off x="5377241" y="2163915"/>
+            <a:ext cx="418704" cy="369332"/>
+          </a:xfrm>
+          <a:prstGeom prst="rect">
+            <a:avLst/>
+          </a:prstGeom>
+          <a:noFill/>
+        </p:spPr>
+        <p:txBody>
+          <a:bodyPr wrap="none" rtlCol="0">
+            <a:spAutoFit/>
+          </a:bodyPr>
+          <a:lstStyle/>
+          <a:p>
+            <a:r>
+              <a:rPr lang="en-GB" dirty="0"/>
+              <a:t>11</a:t>
+            </a:r>
+          </a:p>
+        </p:txBody>
+      </p:sp>
+      <p:sp>
+        <p:nvSpPr>
+          <p:cNvPr id="67" name="TextBox 66">
+            <a:extLst>
+              <a:ext uri="{FF2B5EF4-FFF2-40B4-BE49-F238E27FC236}">
+                <a16:creationId xmlns:a16="http://schemas.microsoft.com/office/drawing/2014/main" id="{176D3091-C300-4B31-BD3A-A772393F2439}"/>
+              </a:ext>
+            </a:extLst>
+          </p:cNvPr>
+          <p:cNvSpPr txBox="1"/>
+          <p:nvPr/>
+        </p:nvSpPr>
+        <p:spPr>
+          <a:xfrm>
+            <a:off x="6788085" y="2141403"/>
+            <a:ext cx="301686" cy="369332"/>
+          </a:xfrm>
+          <a:prstGeom prst="rect">
+            <a:avLst/>
+          </a:prstGeom>
+          <a:noFill/>
+        </p:spPr>
+        <p:txBody>
+          <a:bodyPr wrap="none" rtlCol="0">
+            <a:spAutoFit/>
+          </a:bodyPr>
+          <a:lstStyle/>
+          <a:p>
+            <a:r>
+              <a:rPr lang="en-GB" dirty="0"/>
+              <a:t>4</a:t>
+            </a:r>
+          </a:p>
+        </p:txBody>
+      </p:sp>
+      <p:sp>
+        <p:nvSpPr>
+          <p:cNvPr id="68" name="TextBox 67">
+            <a:extLst>
+              <a:ext uri="{FF2B5EF4-FFF2-40B4-BE49-F238E27FC236}">
+                <a16:creationId xmlns:a16="http://schemas.microsoft.com/office/drawing/2014/main" id="{CBC945EE-5DE6-47DB-B38F-2D2F3DFE4187}"/>
+              </a:ext>
+            </a:extLst>
+          </p:cNvPr>
+          <p:cNvSpPr txBox="1"/>
+          <p:nvPr/>
+        </p:nvSpPr>
+        <p:spPr>
+          <a:xfrm>
+            <a:off x="8453555" y="2149537"/>
+            <a:ext cx="301686" cy="369332"/>
+          </a:xfrm>
+          <a:prstGeom prst="rect">
+            <a:avLst/>
+          </a:prstGeom>
+          <a:noFill/>
+        </p:spPr>
+        <p:txBody>
+          <a:bodyPr wrap="none" rtlCol="0">
+            <a:spAutoFit/>
+          </a:bodyPr>
+          <a:lstStyle/>
+          <a:p>
+            <a:r>
+              <a:rPr lang="en-GB" dirty="0"/>
+              <a:t>9</a:t>
+            </a:r>
+          </a:p>
+        </p:txBody>
+      </p:sp>
+      <p:sp>
+        <p:nvSpPr>
+          <p:cNvPr id="69" name="TextBox 68">
+            <a:extLst>
+              <a:ext uri="{FF2B5EF4-FFF2-40B4-BE49-F238E27FC236}">
+                <a16:creationId xmlns:a16="http://schemas.microsoft.com/office/drawing/2014/main" id="{1E5C96A7-80A9-459A-BCAB-29C4C02FE4E7}"/>
+              </a:ext>
+            </a:extLst>
+          </p:cNvPr>
+          <p:cNvSpPr txBox="1"/>
+          <p:nvPr/>
+        </p:nvSpPr>
+        <p:spPr>
+          <a:xfrm>
+            <a:off x="11198236" y="2157230"/>
+            <a:ext cx="301686" cy="369332"/>
+          </a:xfrm>
+          <a:prstGeom prst="rect">
+            <a:avLst/>
+          </a:prstGeom>
+          <a:noFill/>
+        </p:spPr>
+        <p:txBody>
+          <a:bodyPr wrap="none" rtlCol="0">
+            <a:spAutoFit/>
+          </a:bodyPr>
+          <a:lstStyle/>
+          <a:p>
+            <a:r>
+              <a:rPr lang="en-GB" dirty="0"/>
+              <a:t>7</a:t>
+            </a:r>
+          </a:p>
+        </p:txBody>
+      </p:sp>
+      <p:sp>
+        <p:nvSpPr>
+          <p:cNvPr id="70" name="Rectangle: Rounded Corners 69">
+            <a:extLst>
+              <a:ext uri="{FF2B5EF4-FFF2-40B4-BE49-F238E27FC236}">
+                <a16:creationId xmlns:a16="http://schemas.microsoft.com/office/drawing/2014/main" id="{E61067AB-EE6D-4E87-9D0D-B57A068F6515}"/>
+              </a:ext>
+            </a:extLst>
+          </p:cNvPr>
+          <p:cNvSpPr/>
+          <p:nvPr/>
+        </p:nvSpPr>
+        <p:spPr>
+          <a:xfrm>
+            <a:off x="172451" y="147553"/>
+            <a:ext cx="1594544" cy="369332"/>
+          </a:xfrm>
+          <a:prstGeom prst="roundRect">
+            <a:avLst/>
+          </a:prstGeom>
+        </p:spPr>
+        <p:style>
+          <a:lnRef idx="2">
+            <a:schemeClr val="accent1">
+              <a:shade val="50000"/>
+            </a:schemeClr>
+          </a:lnRef>
+          <a:fillRef idx="1">
+            <a:schemeClr val="accent1"/>
+          </a:fillRef>
+          <a:effectRef idx="0">
+            <a:schemeClr val="accent1"/>
+          </a:effectRef>
+          <a:fontRef idx="minor">
+            <a:schemeClr val="lt1"/>
+          </a:fontRef>
+        </p:style>
+        <p:txBody>
+          <a:bodyPr rtlCol="0" anchor="ctr"/>
+          <a:lstStyle/>
+          <a:p>
+            <a:pPr algn="ctr"/>
+            <a:endParaRPr lang="en-GB"/>
+          </a:p>
+        </p:txBody>
+      </p:sp>
+      <p:sp>
+        <p:nvSpPr>
+          <p:cNvPr id="71" name="TextBox 70">
+            <a:extLst>
+              <a:ext uri="{FF2B5EF4-FFF2-40B4-BE49-F238E27FC236}">
+                <a16:creationId xmlns:a16="http://schemas.microsoft.com/office/drawing/2014/main" id="{D50459A9-C6BD-49B7-8D6C-509F0C7EAD56}"/>
+              </a:ext>
+            </a:extLst>
+          </p:cNvPr>
+          <p:cNvSpPr txBox="1"/>
+          <p:nvPr/>
+        </p:nvSpPr>
+        <p:spPr>
+          <a:xfrm>
+            <a:off x="172454" y="192343"/>
+            <a:ext cx="1594541" cy="261610"/>
+          </a:xfrm>
+          <a:prstGeom prst="rect">
+            <a:avLst/>
+          </a:prstGeom>
+          <a:noFill/>
+        </p:spPr>
+        <p:txBody>
+          <a:bodyPr wrap="square" rtlCol="0">
+            <a:spAutoFit/>
+          </a:bodyPr>
+          <a:lstStyle/>
+          <a:p>
+            <a:pPr algn="ctr"/>
+            <a:r>
+              <a:rPr lang="en-GB" sz="1100" dirty="0">
+                <a:solidFill>
+                  <a:schemeClr val="bg1"/>
+                </a:solidFill>
+              </a:rPr>
+              <a:t>Toggle: Topic/Sentiment</a:t>
+            </a:r>
+          </a:p>
+        </p:txBody>
+      </p:sp>
+      <p:sp>
+        <p:nvSpPr>
+          <p:cNvPr id="2" name="TextBox 1">
+            <a:extLst>
+              <a:ext uri="{FF2B5EF4-FFF2-40B4-BE49-F238E27FC236}">
+                <a16:creationId xmlns:a16="http://schemas.microsoft.com/office/drawing/2014/main" id="{CA55914D-CEAC-4F17-AB44-8409E21C3C18}"/>
+              </a:ext>
+            </a:extLst>
+          </p:cNvPr>
+          <p:cNvSpPr txBox="1"/>
+          <p:nvPr/>
+        </p:nvSpPr>
+        <p:spPr>
+          <a:xfrm rot="17739365">
+            <a:off x="9279434" y="4002855"/>
+            <a:ext cx="1441036" cy="276999"/>
+          </a:xfrm>
+          <a:prstGeom prst="rect">
+            <a:avLst/>
+          </a:prstGeom>
+          <a:noFill/>
+        </p:spPr>
+        <p:txBody>
+          <a:bodyPr wrap="none" rtlCol="0">
+            <a:spAutoFit/>
+          </a:bodyPr>
+          <a:lstStyle/>
+          <a:p>
+            <a:r>
+              <a:rPr lang="en-GB" sz="1200" dirty="0"/>
+              <a:t>Parliament in recess</a:t>
+            </a:r>
+          </a:p>
+        </p:txBody>
+      </p:sp>
+      <p:sp>
+        <p:nvSpPr>
+          <p:cNvPr id="72" name="TextBox 71">
+            <a:extLst>
+              <a:ext uri="{FF2B5EF4-FFF2-40B4-BE49-F238E27FC236}">
+                <a16:creationId xmlns:a16="http://schemas.microsoft.com/office/drawing/2014/main" id="{BEE4FB12-2034-4A6B-88E4-58461801753C}"/>
+              </a:ext>
+            </a:extLst>
+          </p:cNvPr>
+          <p:cNvSpPr txBox="1"/>
+          <p:nvPr/>
+        </p:nvSpPr>
+        <p:spPr>
+          <a:xfrm>
+            <a:off x="6424969" y="5196188"/>
+            <a:ext cx="1314034" cy="369332"/>
+          </a:xfrm>
+          <a:prstGeom prst="rect">
+            <a:avLst/>
+          </a:prstGeom>
+          <a:noFill/>
+        </p:spPr>
+        <p:txBody>
+          <a:bodyPr wrap="square" rtlCol="0">
+            <a:spAutoFit/>
+          </a:bodyPr>
+          <a:lstStyle/>
+          <a:p>
+            <a:pPr algn="ctr"/>
+            <a:r>
+              <a:rPr lang="en-GB" dirty="0"/>
+              <a:t>Sentiment</a:t>
+            </a:r>
+          </a:p>
+        </p:txBody>
+      </p:sp>
+      <p:sp>
+        <p:nvSpPr>
+          <p:cNvPr id="75" name="Rectangle: Rounded Corners 74">
+            <a:extLst>
+              <a:ext uri="{FF2B5EF4-FFF2-40B4-BE49-F238E27FC236}">
+                <a16:creationId xmlns:a16="http://schemas.microsoft.com/office/drawing/2014/main" id="{24206795-EFD1-4DCF-ACAC-13FC0BE0A71C}"/>
+              </a:ext>
+            </a:extLst>
+          </p:cNvPr>
+          <p:cNvSpPr/>
+          <p:nvPr/>
+        </p:nvSpPr>
+        <p:spPr>
+          <a:xfrm>
+            <a:off x="5051627" y="716983"/>
+            <a:ext cx="1989221" cy="433137"/>
+          </a:xfrm>
+          <a:prstGeom prst="roundRect">
+            <a:avLst/>
+          </a:prstGeom>
+        </p:spPr>
+        <p:style>
+          <a:lnRef idx="2">
+            <a:schemeClr val="accent1">
+              <a:shade val="50000"/>
+            </a:schemeClr>
+          </a:lnRef>
+          <a:fillRef idx="1">
+            <a:schemeClr val="accent1"/>
+          </a:fillRef>
+          <a:effectRef idx="0">
+            <a:schemeClr val="accent1"/>
+          </a:effectRef>
+          <a:fontRef idx="minor">
+            <a:schemeClr val="lt1"/>
+          </a:fontRef>
+        </p:style>
+        <p:txBody>
+          <a:bodyPr rtlCol="0" anchor="ctr"/>
+          <a:lstStyle/>
+          <a:p>
+            <a:pPr algn="ctr"/>
+            <a:endParaRPr lang="en-GB"/>
+          </a:p>
+        </p:txBody>
+      </p:sp>
+      <p:sp>
+        <p:nvSpPr>
+          <p:cNvPr id="76" name="TextBox 75">
+            <a:extLst>
+              <a:ext uri="{FF2B5EF4-FFF2-40B4-BE49-F238E27FC236}">
+                <a16:creationId xmlns:a16="http://schemas.microsoft.com/office/drawing/2014/main" id="{B21811AC-55B8-4FAE-AF8B-B1F038CAE214}"/>
+              </a:ext>
+            </a:extLst>
+          </p:cNvPr>
+          <p:cNvSpPr txBox="1"/>
+          <p:nvPr/>
+        </p:nvSpPr>
+        <p:spPr>
+          <a:xfrm>
+            <a:off x="5252152" y="733024"/>
+            <a:ext cx="1655459" cy="369332"/>
+          </a:xfrm>
+          <a:prstGeom prst="rect">
+            <a:avLst/>
+          </a:prstGeom>
+          <a:noFill/>
+        </p:spPr>
+        <p:txBody>
+          <a:bodyPr wrap="square" rtlCol="0">
+            <a:spAutoFit/>
+          </a:bodyPr>
+          <a:lstStyle/>
+          <a:p>
+            <a:pPr algn="ctr"/>
+            <a:r>
+              <a:rPr lang="en-GB" dirty="0">
+                <a:solidFill>
+                  <a:schemeClr val="bg1"/>
+                </a:solidFill>
+              </a:rPr>
+              <a:t>Filter -- Speaker</a:t>
+            </a:r>
+          </a:p>
+        </p:txBody>
+      </p:sp>
+      <p:sp>
+        <p:nvSpPr>
+          <p:cNvPr id="73" name="Rectangle 72">
+            <a:extLst>
+              <a:ext uri="{FF2B5EF4-FFF2-40B4-BE49-F238E27FC236}">
+                <a16:creationId xmlns:a16="http://schemas.microsoft.com/office/drawing/2014/main" id="{833B069C-AC1E-46B7-8C3D-1A2753ED63C5}"/>
+              </a:ext>
+            </a:extLst>
+          </p:cNvPr>
+          <p:cNvSpPr/>
+          <p:nvPr/>
+        </p:nvSpPr>
+        <p:spPr>
+          <a:xfrm>
+            <a:off x="1017195" y="3547042"/>
+            <a:ext cx="201832" cy="1277989"/>
+          </a:xfrm>
+          <a:prstGeom prst="rect">
+            <a:avLst/>
+          </a:prstGeom>
+        </p:spPr>
+        <p:style>
+          <a:lnRef idx="2">
+            <a:schemeClr val="accent3">
+              <a:shade val="50000"/>
+            </a:schemeClr>
+          </a:lnRef>
+          <a:fillRef idx="1">
+            <a:schemeClr val="accent3"/>
+          </a:fillRef>
+          <a:effectRef idx="0">
+            <a:schemeClr val="accent3"/>
+          </a:effectRef>
+          <a:fontRef idx="minor">
+            <a:schemeClr val="lt1"/>
+          </a:fontRef>
+        </p:style>
+        <p:txBody>
+          <a:bodyPr rtlCol="0" anchor="ctr"/>
+          <a:lstStyle/>
+          <a:p>
+            <a:pPr algn="ctr"/>
+            <a:endParaRPr lang="en-GB"/>
+          </a:p>
+        </p:txBody>
+      </p:sp>
+      <p:sp>
+        <p:nvSpPr>
+          <p:cNvPr id="74" name="Rectangle 73">
+            <a:extLst>
+              <a:ext uri="{FF2B5EF4-FFF2-40B4-BE49-F238E27FC236}">
+                <a16:creationId xmlns:a16="http://schemas.microsoft.com/office/drawing/2014/main" id="{90AF28AA-3C14-4C61-9951-0BB26877DA1C}"/>
+              </a:ext>
+            </a:extLst>
+          </p:cNvPr>
+          <p:cNvSpPr/>
+          <p:nvPr/>
+        </p:nvSpPr>
+        <p:spPr>
+          <a:xfrm>
+            <a:off x="1302239" y="2775922"/>
+            <a:ext cx="201832" cy="2056375"/>
+          </a:xfrm>
+          <a:prstGeom prst="rect">
+            <a:avLst/>
+          </a:prstGeom>
+        </p:spPr>
+        <p:style>
+          <a:lnRef idx="2">
+            <a:schemeClr val="accent3">
+              <a:shade val="50000"/>
+            </a:schemeClr>
+          </a:lnRef>
+          <a:fillRef idx="1">
+            <a:schemeClr val="accent3"/>
+          </a:fillRef>
+          <a:effectRef idx="0">
+            <a:schemeClr val="accent3"/>
+          </a:effectRef>
+          <a:fontRef idx="minor">
+            <a:schemeClr val="lt1"/>
+          </a:fontRef>
+        </p:style>
+        <p:txBody>
+          <a:bodyPr rtlCol="0" anchor="ctr"/>
+          <a:lstStyle/>
+          <a:p>
+            <a:pPr algn="ctr"/>
+            <a:endParaRPr lang="en-GB" dirty="0"/>
+          </a:p>
+        </p:txBody>
+      </p:sp>
+      <p:sp>
+        <p:nvSpPr>
+          <p:cNvPr id="77" name="Rectangle 76">
+            <a:extLst>
+              <a:ext uri="{FF2B5EF4-FFF2-40B4-BE49-F238E27FC236}">
+                <a16:creationId xmlns:a16="http://schemas.microsoft.com/office/drawing/2014/main" id="{0DD34039-F2FE-4B87-B728-78805595D02C}"/>
+              </a:ext>
+            </a:extLst>
+          </p:cNvPr>
+          <p:cNvSpPr/>
+          <p:nvPr/>
+        </p:nvSpPr>
+        <p:spPr>
+          <a:xfrm>
+            <a:off x="1595549" y="4401111"/>
+            <a:ext cx="201832" cy="433137"/>
+          </a:xfrm>
+          <a:prstGeom prst="rect">
+            <a:avLst/>
+          </a:prstGeom>
+        </p:spPr>
+        <p:style>
+          <a:lnRef idx="2">
+            <a:schemeClr val="accent3">
+              <a:shade val="50000"/>
+            </a:schemeClr>
+          </a:lnRef>
+          <a:fillRef idx="1">
+            <a:schemeClr val="accent3"/>
+          </a:fillRef>
+          <a:effectRef idx="0">
+            <a:schemeClr val="accent3"/>
+          </a:effectRef>
+          <a:fontRef idx="minor">
+            <a:schemeClr val="lt1"/>
+          </a:fontRef>
+        </p:style>
+        <p:txBody>
+          <a:bodyPr rtlCol="0" anchor="ctr"/>
+          <a:lstStyle/>
+          <a:p>
+            <a:pPr algn="ctr"/>
+            <a:endParaRPr lang="en-GB"/>
+          </a:p>
+        </p:txBody>
+      </p:sp>
+      <p:sp>
+        <p:nvSpPr>
+          <p:cNvPr id="78" name="Rectangle 77">
+            <a:extLst>
+              <a:ext uri="{FF2B5EF4-FFF2-40B4-BE49-F238E27FC236}">
+                <a16:creationId xmlns:a16="http://schemas.microsoft.com/office/drawing/2014/main" id="{E5CD8A4A-D49B-4A8A-AD0E-E6C5F95C10A0}"/>
+              </a:ext>
+            </a:extLst>
+          </p:cNvPr>
+          <p:cNvSpPr/>
+          <p:nvPr/>
+        </p:nvSpPr>
+        <p:spPr>
+          <a:xfrm>
+            <a:off x="5125321" y="3054795"/>
+            <a:ext cx="201832" cy="1777203"/>
+          </a:xfrm>
+          <a:prstGeom prst="rect">
+            <a:avLst/>
+          </a:prstGeom>
+        </p:spPr>
+        <p:style>
+          <a:lnRef idx="2">
+            <a:schemeClr val="accent3">
+              <a:shade val="50000"/>
+            </a:schemeClr>
+          </a:lnRef>
+          <a:fillRef idx="1">
+            <a:schemeClr val="accent3"/>
+          </a:fillRef>
+          <a:effectRef idx="0">
+            <a:schemeClr val="accent3"/>
+          </a:effectRef>
+          <a:fontRef idx="minor">
+            <a:schemeClr val="lt1"/>
+          </a:fontRef>
+        </p:style>
+        <p:txBody>
+          <a:bodyPr rtlCol="0" anchor="ctr"/>
+          <a:lstStyle/>
+          <a:p>
+            <a:pPr algn="ctr"/>
+            <a:endParaRPr lang="en-GB"/>
+          </a:p>
+        </p:txBody>
+      </p:sp>
+      <p:sp>
+        <p:nvSpPr>
+          <p:cNvPr id="79" name="Rectangle 78">
+            <a:extLst>
+              <a:ext uri="{FF2B5EF4-FFF2-40B4-BE49-F238E27FC236}">
+                <a16:creationId xmlns:a16="http://schemas.microsoft.com/office/drawing/2014/main" id="{DB7B316B-3863-4298-9E0C-C13711E1FEBF}"/>
+              </a:ext>
+            </a:extLst>
+          </p:cNvPr>
+          <p:cNvSpPr/>
+          <p:nvPr/>
+        </p:nvSpPr>
+        <p:spPr>
+          <a:xfrm>
+            <a:off x="5463543" y="3054795"/>
+            <a:ext cx="201832" cy="1770236"/>
+          </a:xfrm>
+          <a:prstGeom prst="rect">
+            <a:avLst/>
+          </a:prstGeom>
+        </p:spPr>
+        <p:style>
+          <a:lnRef idx="2">
+            <a:schemeClr val="accent3">
+              <a:shade val="50000"/>
+            </a:schemeClr>
+          </a:lnRef>
+          <a:fillRef idx="1">
+            <a:schemeClr val="accent3"/>
+          </a:fillRef>
+          <a:effectRef idx="0">
+            <a:schemeClr val="accent3"/>
+          </a:effectRef>
+          <a:fontRef idx="minor">
+            <a:schemeClr val="lt1"/>
+          </a:fontRef>
+        </p:style>
+        <p:txBody>
+          <a:bodyPr rtlCol="0" anchor="ctr"/>
+          <a:lstStyle/>
+          <a:p>
+            <a:pPr algn="ctr"/>
+            <a:endParaRPr lang="en-GB"/>
+          </a:p>
+        </p:txBody>
+      </p:sp>
+      <p:sp>
+        <p:nvSpPr>
+          <p:cNvPr id="81" name="Rectangle 80">
+            <a:extLst>
+              <a:ext uri="{FF2B5EF4-FFF2-40B4-BE49-F238E27FC236}">
+                <a16:creationId xmlns:a16="http://schemas.microsoft.com/office/drawing/2014/main" id="{AF0E0B3F-687B-4460-BAB0-394E560ABCD3}"/>
+              </a:ext>
+            </a:extLst>
+          </p:cNvPr>
+          <p:cNvSpPr/>
+          <p:nvPr/>
+        </p:nvSpPr>
+        <p:spPr>
+          <a:xfrm>
+            <a:off x="5793292" y="3883410"/>
+            <a:ext cx="201832" cy="943021"/>
+          </a:xfrm>
+          <a:prstGeom prst="rect">
+            <a:avLst/>
+          </a:prstGeom>
+        </p:spPr>
+        <p:style>
+          <a:lnRef idx="2">
+            <a:schemeClr val="accent3">
+              <a:shade val="50000"/>
+            </a:schemeClr>
+          </a:lnRef>
+          <a:fillRef idx="1">
+            <a:schemeClr val="accent3"/>
+          </a:fillRef>
+          <a:effectRef idx="0">
+            <a:schemeClr val="accent3"/>
+          </a:effectRef>
+          <a:fontRef idx="minor">
+            <a:schemeClr val="lt1"/>
+          </a:fontRef>
+        </p:style>
+        <p:txBody>
+          <a:bodyPr rtlCol="0" anchor="ctr"/>
+          <a:lstStyle/>
+          <a:p>
+            <a:pPr algn="ctr"/>
+            <a:endParaRPr lang="en-GB"/>
+          </a:p>
+        </p:txBody>
+      </p:sp>
+      <p:sp>
+        <p:nvSpPr>
+          <p:cNvPr id="82" name="Rectangle 81">
+            <a:extLst>
+              <a:ext uri="{FF2B5EF4-FFF2-40B4-BE49-F238E27FC236}">
+                <a16:creationId xmlns:a16="http://schemas.microsoft.com/office/drawing/2014/main" id="{97622970-444C-4BDC-B532-1AC18531BA4E}"/>
+              </a:ext>
+            </a:extLst>
+          </p:cNvPr>
+          <p:cNvSpPr/>
+          <p:nvPr/>
+        </p:nvSpPr>
+        <p:spPr>
+          <a:xfrm>
+            <a:off x="2148419" y="3891227"/>
+            <a:ext cx="201832" cy="940771"/>
+          </a:xfrm>
+          <a:prstGeom prst="rect">
+            <a:avLst/>
+          </a:prstGeom>
+        </p:spPr>
+        <p:style>
+          <a:lnRef idx="2">
+            <a:schemeClr val="accent3">
+              <a:shade val="50000"/>
+            </a:schemeClr>
+          </a:lnRef>
+          <a:fillRef idx="1">
+            <a:schemeClr val="accent3"/>
+          </a:fillRef>
+          <a:effectRef idx="0">
+            <a:schemeClr val="accent3"/>
+          </a:effectRef>
+          <a:fontRef idx="minor">
+            <a:schemeClr val="lt1"/>
+          </a:fontRef>
+        </p:style>
+        <p:txBody>
+          <a:bodyPr rtlCol="0" anchor="ctr"/>
+          <a:lstStyle/>
+          <a:p>
+            <a:pPr algn="ctr"/>
+            <a:endParaRPr lang="en-GB"/>
+          </a:p>
+        </p:txBody>
+      </p:sp>
+      <p:sp>
+        <p:nvSpPr>
+          <p:cNvPr id="84" name="Rectangle 83">
+            <a:extLst>
+              <a:ext uri="{FF2B5EF4-FFF2-40B4-BE49-F238E27FC236}">
+                <a16:creationId xmlns:a16="http://schemas.microsoft.com/office/drawing/2014/main" id="{3B02EC17-FA01-4EB9-A343-C4E02A0858B1}"/>
+              </a:ext>
+            </a:extLst>
+          </p:cNvPr>
+          <p:cNvSpPr/>
+          <p:nvPr/>
+        </p:nvSpPr>
+        <p:spPr>
+          <a:xfrm>
+            <a:off x="2488426" y="2790585"/>
+            <a:ext cx="201832" cy="2056375"/>
+          </a:xfrm>
+          <a:prstGeom prst="rect">
+            <a:avLst/>
+          </a:prstGeom>
+        </p:spPr>
+        <p:style>
+          <a:lnRef idx="2">
+            <a:schemeClr val="accent3">
+              <a:shade val="50000"/>
+            </a:schemeClr>
+          </a:lnRef>
+          <a:fillRef idx="1">
+            <a:schemeClr val="accent3"/>
+          </a:fillRef>
+          <a:effectRef idx="0">
+            <a:schemeClr val="accent3"/>
+          </a:effectRef>
+          <a:fontRef idx="minor">
+            <a:schemeClr val="lt1"/>
+          </a:fontRef>
+        </p:style>
+        <p:txBody>
+          <a:bodyPr rtlCol="0" anchor="ctr"/>
+          <a:lstStyle/>
+          <a:p>
+            <a:pPr algn="ctr"/>
+            <a:endParaRPr lang="en-GB"/>
+          </a:p>
+        </p:txBody>
+      </p:sp>
+      <p:sp>
+        <p:nvSpPr>
+          <p:cNvPr id="85" name="Rectangle 84">
+            <a:extLst>
+              <a:ext uri="{FF2B5EF4-FFF2-40B4-BE49-F238E27FC236}">
+                <a16:creationId xmlns:a16="http://schemas.microsoft.com/office/drawing/2014/main" id="{2B767FE8-4DB6-413F-940F-99F1C9386244}"/>
+              </a:ext>
+            </a:extLst>
+          </p:cNvPr>
+          <p:cNvSpPr/>
+          <p:nvPr/>
+        </p:nvSpPr>
+        <p:spPr>
+          <a:xfrm>
+            <a:off x="2759345" y="4408414"/>
+            <a:ext cx="201832" cy="433137"/>
+          </a:xfrm>
+          <a:prstGeom prst="rect">
+            <a:avLst/>
+          </a:prstGeom>
+        </p:spPr>
+        <p:style>
+          <a:lnRef idx="2">
+            <a:schemeClr val="accent3">
+              <a:shade val="50000"/>
+            </a:schemeClr>
+          </a:lnRef>
+          <a:fillRef idx="1">
+            <a:schemeClr val="accent3"/>
+          </a:fillRef>
+          <a:effectRef idx="0">
+            <a:schemeClr val="accent3"/>
+          </a:effectRef>
+          <a:fontRef idx="minor">
+            <a:schemeClr val="lt1"/>
+          </a:fontRef>
+        </p:style>
+        <p:txBody>
+          <a:bodyPr rtlCol="0" anchor="ctr"/>
+          <a:lstStyle/>
+          <a:p>
+            <a:pPr algn="ctr"/>
+            <a:endParaRPr lang="en-GB"/>
+          </a:p>
+        </p:txBody>
+      </p:sp>
+      <p:sp>
+        <p:nvSpPr>
+          <p:cNvPr id="87" name="Rectangle 86">
+            <a:extLst>
+              <a:ext uri="{FF2B5EF4-FFF2-40B4-BE49-F238E27FC236}">
+                <a16:creationId xmlns:a16="http://schemas.microsoft.com/office/drawing/2014/main" id="{A61F5DEB-FD74-46D1-91F6-6696A7B77F04}"/>
+              </a:ext>
+            </a:extLst>
+          </p:cNvPr>
+          <p:cNvSpPr/>
+          <p:nvPr/>
+        </p:nvSpPr>
+        <p:spPr>
+          <a:xfrm>
+            <a:off x="3729373" y="3554972"/>
+            <a:ext cx="201832" cy="1277989"/>
+          </a:xfrm>
+          <a:prstGeom prst="rect">
+            <a:avLst/>
+          </a:prstGeom>
+        </p:spPr>
+        <p:style>
+          <a:lnRef idx="2">
+            <a:schemeClr val="accent3">
+              <a:shade val="50000"/>
+            </a:schemeClr>
+          </a:lnRef>
+          <a:fillRef idx="1">
+            <a:schemeClr val="accent3"/>
+          </a:fillRef>
+          <a:effectRef idx="0">
+            <a:schemeClr val="accent3"/>
+          </a:effectRef>
+          <a:fontRef idx="minor">
+            <a:schemeClr val="lt1"/>
+          </a:fontRef>
+        </p:style>
+        <p:txBody>
+          <a:bodyPr rtlCol="0" anchor="ctr"/>
+          <a:lstStyle/>
+          <a:p>
+            <a:pPr algn="ctr"/>
+            <a:endParaRPr lang="en-GB"/>
+          </a:p>
+        </p:txBody>
+      </p:sp>
+      <p:sp>
+        <p:nvSpPr>
+          <p:cNvPr id="88" name="Rectangle 87">
+            <a:extLst>
+              <a:ext uri="{FF2B5EF4-FFF2-40B4-BE49-F238E27FC236}">
+                <a16:creationId xmlns:a16="http://schemas.microsoft.com/office/drawing/2014/main" id="{321A2EA2-8E7D-4C95-8B1C-E18ACF1D95C5}"/>
+              </a:ext>
+            </a:extLst>
+          </p:cNvPr>
+          <p:cNvSpPr/>
+          <p:nvPr/>
+        </p:nvSpPr>
+        <p:spPr>
+          <a:xfrm>
+            <a:off x="4022142" y="2784629"/>
+            <a:ext cx="201832" cy="2056375"/>
+          </a:xfrm>
+          <a:prstGeom prst="rect">
+            <a:avLst/>
+          </a:prstGeom>
+        </p:spPr>
+        <p:style>
+          <a:lnRef idx="2">
+            <a:schemeClr val="accent3">
+              <a:shade val="50000"/>
+            </a:schemeClr>
+          </a:lnRef>
+          <a:fillRef idx="1">
+            <a:schemeClr val="accent3"/>
+          </a:fillRef>
+          <a:effectRef idx="0">
+            <a:schemeClr val="accent3"/>
+          </a:effectRef>
+          <a:fontRef idx="minor">
+            <a:schemeClr val="lt1"/>
+          </a:fontRef>
+        </p:style>
+        <p:txBody>
+          <a:bodyPr rtlCol="0" anchor="ctr"/>
+          <a:lstStyle/>
+          <a:p>
+            <a:pPr algn="ctr"/>
+            <a:endParaRPr lang="en-GB"/>
+          </a:p>
+        </p:txBody>
+      </p:sp>
+      <p:sp>
+        <p:nvSpPr>
+          <p:cNvPr id="89" name="Rectangle 88">
+            <a:extLst>
+              <a:ext uri="{FF2B5EF4-FFF2-40B4-BE49-F238E27FC236}">
+                <a16:creationId xmlns:a16="http://schemas.microsoft.com/office/drawing/2014/main" id="{3648FDA9-A552-426C-AC4F-8143A65DAC33}"/>
+              </a:ext>
+            </a:extLst>
+          </p:cNvPr>
+          <p:cNvSpPr/>
+          <p:nvPr/>
+        </p:nvSpPr>
+        <p:spPr>
+          <a:xfrm>
+            <a:off x="4317585" y="3954383"/>
+            <a:ext cx="201832" cy="879866"/>
+          </a:xfrm>
+          <a:prstGeom prst="rect">
+            <a:avLst/>
+          </a:prstGeom>
+        </p:spPr>
+        <p:style>
+          <a:lnRef idx="2">
+            <a:schemeClr val="accent3">
+              <a:shade val="50000"/>
+            </a:schemeClr>
+          </a:lnRef>
+          <a:fillRef idx="1">
+            <a:schemeClr val="accent3"/>
+          </a:fillRef>
+          <a:effectRef idx="0">
+            <a:schemeClr val="accent3"/>
+          </a:effectRef>
+          <a:fontRef idx="minor">
+            <a:schemeClr val="lt1"/>
+          </a:fontRef>
+        </p:style>
+        <p:txBody>
+          <a:bodyPr rtlCol="0" anchor="ctr"/>
+          <a:lstStyle/>
+          <a:p>
+            <a:pPr algn="ctr"/>
+            <a:endParaRPr lang="en-GB"/>
+          </a:p>
+        </p:txBody>
+      </p:sp>
+      <p:sp>
+        <p:nvSpPr>
+          <p:cNvPr id="90" name="Rectangle 89">
+            <a:extLst>
+              <a:ext uri="{FF2B5EF4-FFF2-40B4-BE49-F238E27FC236}">
+                <a16:creationId xmlns:a16="http://schemas.microsoft.com/office/drawing/2014/main" id="{E486323E-C078-4600-87BB-01740E4BB33F}"/>
+              </a:ext>
+            </a:extLst>
+          </p:cNvPr>
+          <p:cNvSpPr/>
+          <p:nvPr/>
+        </p:nvSpPr>
+        <p:spPr>
+          <a:xfrm>
+            <a:off x="6719100" y="4255266"/>
+            <a:ext cx="201832" cy="569573"/>
+          </a:xfrm>
+          <a:prstGeom prst="rect">
+            <a:avLst/>
+          </a:prstGeom>
+        </p:spPr>
+        <p:style>
+          <a:lnRef idx="2">
+            <a:schemeClr val="accent3">
+              <a:shade val="50000"/>
+            </a:schemeClr>
+          </a:lnRef>
+          <a:fillRef idx="1">
+            <a:schemeClr val="accent3"/>
+          </a:fillRef>
+          <a:effectRef idx="0">
+            <a:schemeClr val="accent3"/>
+          </a:effectRef>
+          <a:fontRef idx="minor">
+            <a:schemeClr val="lt1"/>
+          </a:fontRef>
+        </p:style>
+        <p:txBody>
+          <a:bodyPr rtlCol="0" anchor="ctr"/>
+          <a:lstStyle/>
+          <a:p>
+            <a:pPr algn="ctr"/>
+            <a:endParaRPr lang="en-GB"/>
+          </a:p>
+        </p:txBody>
+      </p:sp>
+      <p:sp>
+        <p:nvSpPr>
+          <p:cNvPr id="93" name="Rectangle 92">
+            <a:extLst>
+              <a:ext uri="{FF2B5EF4-FFF2-40B4-BE49-F238E27FC236}">
+                <a16:creationId xmlns:a16="http://schemas.microsoft.com/office/drawing/2014/main" id="{EEAB04C7-297B-4385-B815-8C54A2DC5A74}"/>
+              </a:ext>
+            </a:extLst>
+          </p:cNvPr>
+          <p:cNvSpPr/>
+          <p:nvPr/>
+        </p:nvSpPr>
+        <p:spPr>
+          <a:xfrm>
+            <a:off x="7028997" y="4255266"/>
+            <a:ext cx="201832" cy="562501"/>
+          </a:xfrm>
+          <a:prstGeom prst="rect">
+            <a:avLst/>
+          </a:prstGeom>
+        </p:spPr>
+        <p:style>
+          <a:lnRef idx="2">
+            <a:schemeClr val="accent3">
+              <a:shade val="50000"/>
+            </a:schemeClr>
+          </a:lnRef>
+          <a:fillRef idx="1">
+            <a:schemeClr val="accent3"/>
+          </a:fillRef>
+          <a:effectRef idx="0">
+            <a:schemeClr val="accent3"/>
+          </a:effectRef>
+          <a:fontRef idx="minor">
+            <a:schemeClr val="lt1"/>
+          </a:fontRef>
+        </p:style>
+        <p:txBody>
+          <a:bodyPr rtlCol="0" anchor="ctr"/>
+          <a:lstStyle/>
+          <a:p>
+            <a:pPr algn="ctr"/>
+            <a:endParaRPr lang="en-GB"/>
+          </a:p>
+        </p:txBody>
+      </p:sp>
+      <p:sp>
+        <p:nvSpPr>
+          <p:cNvPr id="94" name="Rectangle 93">
+            <a:extLst>
+              <a:ext uri="{FF2B5EF4-FFF2-40B4-BE49-F238E27FC236}">
+                <a16:creationId xmlns:a16="http://schemas.microsoft.com/office/drawing/2014/main" id="{0300C036-973D-48E3-8A70-334C2EF15DFE}"/>
+              </a:ext>
+            </a:extLst>
+          </p:cNvPr>
+          <p:cNvSpPr/>
+          <p:nvPr/>
+        </p:nvSpPr>
+        <p:spPr>
+          <a:xfrm>
+            <a:off x="8132143" y="3883410"/>
+            <a:ext cx="201832" cy="940771"/>
+          </a:xfrm>
+          <a:prstGeom prst="rect">
+            <a:avLst/>
+          </a:prstGeom>
+        </p:spPr>
+        <p:style>
+          <a:lnRef idx="2">
+            <a:schemeClr val="accent3">
+              <a:shade val="50000"/>
+            </a:schemeClr>
+          </a:lnRef>
+          <a:fillRef idx="1">
+            <a:schemeClr val="accent3"/>
+          </a:fillRef>
+          <a:effectRef idx="0">
+            <a:schemeClr val="accent3"/>
+          </a:effectRef>
+          <a:fontRef idx="minor">
+            <a:schemeClr val="lt1"/>
+          </a:fontRef>
+        </p:style>
+        <p:txBody>
+          <a:bodyPr rtlCol="0" anchor="ctr"/>
+          <a:lstStyle/>
+          <a:p>
+            <a:pPr algn="ctr"/>
+            <a:endParaRPr lang="en-GB"/>
+          </a:p>
+        </p:txBody>
+      </p:sp>
+      <p:sp>
+        <p:nvSpPr>
+          <p:cNvPr id="95" name="Rectangle 94">
+            <a:extLst>
+              <a:ext uri="{FF2B5EF4-FFF2-40B4-BE49-F238E27FC236}">
+                <a16:creationId xmlns:a16="http://schemas.microsoft.com/office/drawing/2014/main" id="{F7353520-7CC0-4C4D-AF04-211D75852ACC}"/>
+              </a:ext>
+            </a:extLst>
+          </p:cNvPr>
+          <p:cNvSpPr/>
+          <p:nvPr/>
+        </p:nvSpPr>
+        <p:spPr>
+          <a:xfrm>
+            <a:off x="8417187" y="3539778"/>
+            <a:ext cx="201832" cy="1277989"/>
+          </a:xfrm>
+          <a:prstGeom prst="rect">
+            <a:avLst/>
+          </a:prstGeom>
+        </p:spPr>
+        <p:style>
+          <a:lnRef idx="2">
+            <a:schemeClr val="accent3">
+              <a:shade val="50000"/>
+            </a:schemeClr>
+          </a:lnRef>
+          <a:fillRef idx="1">
+            <a:schemeClr val="accent3"/>
+          </a:fillRef>
+          <a:effectRef idx="0">
+            <a:schemeClr val="accent3"/>
+          </a:effectRef>
+          <a:fontRef idx="minor">
+            <a:schemeClr val="lt1"/>
+          </a:fontRef>
+        </p:style>
+        <p:txBody>
+          <a:bodyPr rtlCol="0" anchor="ctr"/>
+          <a:lstStyle/>
+          <a:p>
+            <a:pPr algn="ctr"/>
+            <a:endParaRPr lang="en-GB"/>
+          </a:p>
+        </p:txBody>
+      </p:sp>
+      <p:sp>
+        <p:nvSpPr>
+          <p:cNvPr id="97" name="Rectangle 96">
+            <a:extLst>
+              <a:ext uri="{FF2B5EF4-FFF2-40B4-BE49-F238E27FC236}">
+                <a16:creationId xmlns:a16="http://schemas.microsoft.com/office/drawing/2014/main" id="{D1E57004-B599-44ED-A86A-65285F33B271}"/>
+              </a:ext>
+            </a:extLst>
+          </p:cNvPr>
+          <p:cNvSpPr/>
+          <p:nvPr/>
+        </p:nvSpPr>
+        <p:spPr>
+          <a:xfrm>
+            <a:off x="8725477" y="3554973"/>
+            <a:ext cx="201832" cy="1279276"/>
+          </a:xfrm>
+          <a:prstGeom prst="rect">
+            <a:avLst/>
+          </a:prstGeom>
+        </p:spPr>
+        <p:style>
+          <a:lnRef idx="2">
+            <a:schemeClr val="accent3">
+              <a:shade val="50000"/>
+            </a:schemeClr>
+          </a:lnRef>
+          <a:fillRef idx="1">
+            <a:schemeClr val="accent3"/>
+          </a:fillRef>
+          <a:effectRef idx="0">
+            <a:schemeClr val="accent3"/>
+          </a:effectRef>
+          <a:fontRef idx="minor">
+            <a:schemeClr val="lt1"/>
+          </a:fontRef>
+        </p:style>
+        <p:txBody>
+          <a:bodyPr rtlCol="0" anchor="ctr"/>
+          <a:lstStyle/>
+          <a:p>
+            <a:pPr algn="ctr"/>
+            <a:endParaRPr lang="en-GB"/>
+          </a:p>
+        </p:txBody>
+      </p:sp>
+      <p:sp>
+        <p:nvSpPr>
+          <p:cNvPr id="100" name="Rectangle 99">
+            <a:extLst>
+              <a:ext uri="{FF2B5EF4-FFF2-40B4-BE49-F238E27FC236}">
+                <a16:creationId xmlns:a16="http://schemas.microsoft.com/office/drawing/2014/main" id="{A89C8272-6E7E-4248-9D97-5EC31A7C6BE6}"/>
+              </a:ext>
+            </a:extLst>
+          </p:cNvPr>
+          <p:cNvSpPr/>
+          <p:nvPr/>
+        </p:nvSpPr>
+        <p:spPr>
+          <a:xfrm>
+            <a:off x="11298090" y="2775922"/>
+            <a:ext cx="201832" cy="2056375"/>
+          </a:xfrm>
+          <a:prstGeom prst="rect">
+            <a:avLst/>
+          </a:prstGeom>
+        </p:spPr>
+        <p:style>
+          <a:lnRef idx="2">
+            <a:schemeClr val="accent3">
+              <a:shade val="50000"/>
+            </a:schemeClr>
+          </a:lnRef>
+          <a:fillRef idx="1">
+            <a:schemeClr val="accent3"/>
+          </a:fillRef>
+          <a:effectRef idx="0">
+            <a:schemeClr val="accent3"/>
+          </a:effectRef>
+          <a:fontRef idx="minor">
+            <a:schemeClr val="lt1"/>
+          </a:fontRef>
+        </p:style>
+        <p:txBody>
+          <a:bodyPr rtlCol="0" anchor="ctr"/>
+          <a:lstStyle/>
+          <a:p>
+            <a:pPr algn="ctr"/>
+            <a:endParaRPr lang="en-GB"/>
+          </a:p>
+        </p:txBody>
+      </p:sp>
+      <p:sp>
+        <p:nvSpPr>
+          <p:cNvPr id="106" name="Rectangle 105">
+            <a:extLst>
+              <a:ext uri="{FF2B5EF4-FFF2-40B4-BE49-F238E27FC236}">
+                <a16:creationId xmlns:a16="http://schemas.microsoft.com/office/drawing/2014/main" id="{405B2B41-7DDB-46C7-805C-140706E4BC7F}"/>
+              </a:ext>
+            </a:extLst>
+          </p:cNvPr>
+          <p:cNvSpPr/>
+          <p:nvPr/>
+        </p:nvSpPr>
+        <p:spPr>
+          <a:xfrm>
+            <a:off x="11558143" y="4272603"/>
+            <a:ext cx="201832" cy="562501"/>
+          </a:xfrm>
+          <a:prstGeom prst="rect">
+            <a:avLst/>
+          </a:prstGeom>
+        </p:spPr>
+        <p:style>
+          <a:lnRef idx="2">
+            <a:schemeClr val="accent3">
+              <a:shade val="50000"/>
+            </a:schemeClr>
+          </a:lnRef>
+          <a:fillRef idx="1">
+            <a:schemeClr val="accent3"/>
+          </a:fillRef>
+          <a:effectRef idx="0">
+            <a:schemeClr val="accent3"/>
+          </a:effectRef>
+          <a:fontRef idx="minor">
+            <a:schemeClr val="lt1"/>
+          </a:fontRef>
+        </p:style>
+        <p:txBody>
+          <a:bodyPr rtlCol="0" anchor="ctr"/>
+          <a:lstStyle/>
+          <a:p>
+            <a:pPr algn="ctr"/>
+            <a:endParaRPr lang="en-GB"/>
+          </a:p>
+        </p:txBody>
+      </p:sp>
+      <p:sp>
+        <p:nvSpPr>
+          <p:cNvPr id="107" name="Rectangle 106">
+            <a:extLst>
+              <a:ext uri="{FF2B5EF4-FFF2-40B4-BE49-F238E27FC236}">
+                <a16:creationId xmlns:a16="http://schemas.microsoft.com/office/drawing/2014/main" id="{52C44C7D-67CB-4877-ADE2-CCAAE4E4590A}"/>
+              </a:ext>
+            </a:extLst>
+          </p:cNvPr>
+          <p:cNvSpPr/>
+          <p:nvPr/>
+        </p:nvSpPr>
+        <p:spPr>
+          <a:xfrm>
+            <a:off x="11050667" y="4269573"/>
+            <a:ext cx="201832" cy="562501"/>
+          </a:xfrm>
+          <a:prstGeom prst="rect">
+            <a:avLst/>
+          </a:prstGeom>
+        </p:spPr>
+        <p:style>
+          <a:lnRef idx="2">
+            <a:schemeClr val="accent3">
+              <a:shade val="50000"/>
+            </a:schemeClr>
+          </a:lnRef>
+          <a:fillRef idx="1">
+            <a:schemeClr val="accent3"/>
+          </a:fillRef>
+          <a:effectRef idx="0">
+            <a:schemeClr val="accent3"/>
+          </a:effectRef>
+          <a:fontRef idx="minor">
+            <a:schemeClr val="lt1"/>
+          </a:fontRef>
+        </p:style>
+        <p:txBody>
+          <a:bodyPr rtlCol="0" anchor="ctr"/>
+          <a:lstStyle/>
+          <a:p>
+            <a:pPr algn="ctr"/>
+            <a:endParaRPr lang="en-GB"/>
+          </a:p>
+        </p:txBody>
+      </p:sp>
+      <p:sp>
+        <p:nvSpPr>
+          <p:cNvPr id="108" name="Rectangle 107">
+            <a:extLst>
+              <a:ext uri="{FF2B5EF4-FFF2-40B4-BE49-F238E27FC236}">
+                <a16:creationId xmlns:a16="http://schemas.microsoft.com/office/drawing/2014/main" id="{5418DA9D-0527-424A-A542-BCF604DB43D7}"/>
+              </a:ext>
+            </a:extLst>
+          </p:cNvPr>
+          <p:cNvSpPr/>
+          <p:nvPr/>
+        </p:nvSpPr>
+        <p:spPr>
+          <a:xfrm>
+            <a:off x="10799184" y="4269573"/>
+            <a:ext cx="201832" cy="562501"/>
+          </a:xfrm>
+          <a:prstGeom prst="rect">
+            <a:avLst/>
+          </a:prstGeom>
+        </p:spPr>
+        <p:style>
+          <a:lnRef idx="2">
+            <a:schemeClr val="accent3">
+              <a:shade val="50000"/>
+            </a:schemeClr>
+          </a:lnRef>
+          <a:fillRef idx="1">
+            <a:schemeClr val="accent3"/>
+          </a:fillRef>
+          <a:effectRef idx="0">
+            <a:schemeClr val="accent3"/>
+          </a:effectRef>
+          <a:fontRef idx="minor">
+            <a:schemeClr val="lt1"/>
+          </a:fontRef>
+        </p:style>
+        <p:txBody>
+          <a:bodyPr rtlCol="0" anchor="ctr"/>
+          <a:lstStyle/>
+          <a:p>
+            <a:pPr algn="ctr"/>
+            <a:endParaRPr lang="en-GB"/>
+          </a:p>
+        </p:txBody>
+      </p:sp>
+      <p:sp>
+        <p:nvSpPr>
+          <p:cNvPr id="3" name="TextBox 2">
+            <a:extLst>
+              <a:ext uri="{FF2B5EF4-FFF2-40B4-BE49-F238E27FC236}">
+                <a16:creationId xmlns:a16="http://schemas.microsoft.com/office/drawing/2014/main" id="{57E2996F-0C32-4361-97DC-F1179FA8A05D}"/>
+              </a:ext>
+            </a:extLst>
+          </p:cNvPr>
+          <p:cNvSpPr txBox="1"/>
+          <p:nvPr/>
+        </p:nvSpPr>
+        <p:spPr>
+          <a:xfrm rot="16200000">
+            <a:off x="714531" y="3797998"/>
+            <a:ext cx="1346193" cy="307777"/>
+          </a:xfrm>
+          <a:prstGeom prst="rect">
+            <a:avLst/>
+          </a:prstGeom>
+          <a:noFill/>
+        </p:spPr>
+        <p:txBody>
+          <a:bodyPr wrap="square" rtlCol="0">
+            <a:spAutoFit/>
+          </a:bodyPr>
+          <a:lstStyle/>
+          <a:p>
+            <a:pPr algn="ctr"/>
+            <a:r>
+              <a:rPr lang="en-GB" sz="1400" dirty="0"/>
+              <a:t>Crime</a:t>
+            </a:r>
+          </a:p>
+        </p:txBody>
+      </p:sp>
+      <p:sp>
+        <p:nvSpPr>
+          <p:cNvPr id="109" name="TextBox 108">
+            <a:extLst>
+              <a:ext uri="{FF2B5EF4-FFF2-40B4-BE49-F238E27FC236}">
+                <a16:creationId xmlns:a16="http://schemas.microsoft.com/office/drawing/2014/main" id="{527CF8B6-727C-4990-A4A6-6FA689D1635B}"/>
+              </a:ext>
+            </a:extLst>
+          </p:cNvPr>
+          <p:cNvSpPr txBox="1"/>
+          <p:nvPr/>
+        </p:nvSpPr>
+        <p:spPr>
+          <a:xfrm rot="16200000">
+            <a:off x="426865" y="4101377"/>
+            <a:ext cx="1346193" cy="307777"/>
+          </a:xfrm>
+          <a:prstGeom prst="rect">
+            <a:avLst/>
+          </a:prstGeom>
+          <a:noFill/>
+        </p:spPr>
+        <p:txBody>
+          <a:bodyPr wrap="square" rtlCol="0">
+            <a:spAutoFit/>
+          </a:bodyPr>
+          <a:lstStyle/>
+          <a:p>
+            <a:pPr algn="ctr"/>
+            <a:r>
+              <a:rPr lang="en-GB" sz="1400" dirty="0"/>
+              <a:t>COVID</a:t>
+            </a:r>
+          </a:p>
+        </p:txBody>
+      </p:sp>
+      <p:sp>
+        <p:nvSpPr>
+          <p:cNvPr id="110" name="TextBox 109">
+            <a:extLst>
+              <a:ext uri="{FF2B5EF4-FFF2-40B4-BE49-F238E27FC236}">
+                <a16:creationId xmlns:a16="http://schemas.microsoft.com/office/drawing/2014/main" id="{0CC5DF49-BBD2-4510-A5B0-2C4DD3B2D742}"/>
+              </a:ext>
+            </a:extLst>
+          </p:cNvPr>
+          <p:cNvSpPr txBox="1"/>
+          <p:nvPr/>
+        </p:nvSpPr>
+        <p:spPr>
+          <a:xfrm rot="16200000">
+            <a:off x="176850" y="4220190"/>
+            <a:ext cx="1346193" cy="307777"/>
+          </a:xfrm>
+          <a:prstGeom prst="rect">
+            <a:avLst/>
+          </a:prstGeom>
+          <a:noFill/>
+        </p:spPr>
+        <p:txBody>
+          <a:bodyPr wrap="square" rtlCol="0">
+            <a:spAutoFit/>
+          </a:bodyPr>
+          <a:lstStyle/>
+          <a:p>
+            <a:pPr algn="ctr"/>
+            <a:r>
+              <a:rPr lang="en-GB" sz="1400" dirty="0"/>
+              <a:t>Census</a:t>
+            </a:r>
+          </a:p>
+        </p:txBody>
+      </p:sp>
+      <p:sp>
+        <p:nvSpPr>
+          <p:cNvPr id="111" name="TextBox 110">
+            <a:extLst>
+              <a:ext uri="{FF2B5EF4-FFF2-40B4-BE49-F238E27FC236}">
+                <a16:creationId xmlns:a16="http://schemas.microsoft.com/office/drawing/2014/main" id="{1CE12883-98AE-4C49-9B5F-85650D8088D3}"/>
+              </a:ext>
+            </a:extLst>
+          </p:cNvPr>
+          <p:cNvSpPr txBox="1"/>
+          <p:nvPr/>
+        </p:nvSpPr>
+        <p:spPr>
+          <a:xfrm rot="16200000">
+            <a:off x="1019009" y="3723838"/>
+            <a:ext cx="1346193" cy="307777"/>
+          </a:xfrm>
+          <a:prstGeom prst="rect">
+            <a:avLst/>
+          </a:prstGeom>
+          <a:noFill/>
+        </p:spPr>
+        <p:txBody>
+          <a:bodyPr wrap="square" rtlCol="0">
+            <a:spAutoFit/>
+          </a:bodyPr>
+          <a:lstStyle/>
+          <a:p>
+            <a:pPr algn="ctr"/>
+            <a:r>
+              <a:rPr lang="en-GB" sz="1400" dirty="0"/>
+              <a:t>Environment</a:t>
+            </a:r>
+          </a:p>
+        </p:txBody>
+      </p:sp>
+    </p:spTree>
+    <p:extLst>
+      <p:ext uri="{BB962C8B-B14F-4D97-AF65-F5344CB8AC3E}">
+        <p14:creationId xmlns:p14="http://schemas.microsoft.com/office/powerpoint/2010/main" val="249219108"/>
       </p:ext>
     </p:extLst>
   </p:cSld>
@@ -5829,4 +9387,299 @@
     </a:ext>
   </a:extLst>
 </a:theme>
+</file>
+
+<file path=ppt/theme/theme2.xml><?xml version="1.0" encoding="utf-8"?>
+<a:theme xmlns:a="http://schemas.openxmlformats.org/drawingml/2006/main" name="Office Theme">
+  <a:themeElements>
+    <a:clrScheme name="Office">
+      <a:dk1>
+        <a:sysClr val="windowText" lastClr="000000"/>
+      </a:dk1>
+      <a:lt1>
+        <a:sysClr val="window" lastClr="FFFFFF"/>
+      </a:lt1>
+      <a:dk2>
+        <a:srgbClr val="44546A"/>
+      </a:dk2>
+      <a:lt2>
+        <a:srgbClr val="E7E6E6"/>
+      </a:lt2>
+      <a:accent1>
+        <a:srgbClr val="4472C4"/>
+      </a:accent1>
+      <a:accent2>
+        <a:srgbClr val="ED7D31"/>
+      </a:accent2>
+      <a:accent3>
+        <a:srgbClr val="A5A5A5"/>
+      </a:accent3>
+      <a:accent4>
+        <a:srgbClr val="FFC000"/>
+      </a:accent4>
+      <a:accent5>
+        <a:srgbClr val="5B9BD5"/>
+      </a:accent5>
+      <a:accent6>
+        <a:srgbClr val="70AD47"/>
+      </a:accent6>
+      <a:hlink>
+        <a:srgbClr val="0563C1"/>
+      </a:hlink>
+      <a:folHlink>
+        <a:srgbClr val="954F72"/>
+      </a:folHlink>
+    </a:clrScheme>
+    <a:fontScheme name="Office">
+      <a:majorFont>
+        <a:latin typeface="Calibri Light" panose="020F0302020204030204"/>
+        <a:ea typeface=""/>
+        <a:cs typeface=""/>
+        <a:font script="Jpan" typeface="游ゴシック Light"/>
+        <a:font script="Hang" typeface="맑은 고딕"/>
+        <a:font script="Hans" typeface="等线 Light"/>
+        <a:font script="Hant" typeface="新細明體"/>
+        <a:font script="Arab" typeface="Times New Roman"/>
+        <a:font script="Hebr" typeface="Times New Roman"/>
+        <a:font script="Thai" typeface="Angsana New"/>
+        <a:font script="Ethi" typeface="Nyala"/>
+        <a:font script="Beng" typeface="Vrinda"/>
+        <a:font script="Gujr" typeface="Shruti"/>
+        <a:font script="Khmr" typeface="MoolBoran"/>
+        <a:font script="Knda" typeface="Tunga"/>
+        <a:font script="Guru" typeface="Raavi"/>
+        <a:font script="Cans" typeface="Euphemia"/>
+        <a:font script="Cher" typeface="Plantagenet Cherokee"/>
+        <a:font script="Yiii" typeface="Microsoft Yi Baiti"/>
+        <a:font script="Tibt" typeface="Microsoft Himalaya"/>
+        <a:font script="Thaa" typeface="MV Boli"/>
+        <a:font script="Deva" typeface="Mangal"/>
+        <a:font script="Telu" typeface="Gautami"/>
+        <a:font script="Taml" typeface="Latha"/>
+        <a:font script="Syrc" typeface="Estrangelo Edessa"/>
+        <a:font script="Orya" typeface="Kalinga"/>
+        <a:font script="Mlym" typeface="Kartika"/>
+        <a:font script="Laoo" typeface="DokChampa"/>
+        <a:font script="Sinh" typeface="Iskoola Pota"/>
+        <a:font script="Mong" typeface="Mongolian Baiti"/>
+        <a:font script="Viet" typeface="Times New Roman"/>
+        <a:font script="Uigh" typeface="Microsoft Uighur"/>
+        <a:font script="Geor" typeface="Sylfaen"/>
+        <a:font script="Armn" typeface="Arial"/>
+        <a:font script="Bugi" typeface="Leelawadee UI"/>
+        <a:font script="Bopo" typeface="Microsoft JhengHei"/>
+        <a:font script="Java" typeface="Javanese Text"/>
+        <a:font script="Lisu" typeface="Segoe UI"/>
+        <a:font script="Mymr" typeface="Myanmar Text"/>
+        <a:font script="Nkoo" typeface="Ebrima"/>
+        <a:font script="Olck" typeface="Nirmala UI"/>
+        <a:font script="Osma" typeface="Ebrima"/>
+        <a:font script="Phag" typeface="Phagspa"/>
+        <a:font script="Syrn" typeface="Estrangelo Edessa"/>
+        <a:font script="Syrj" typeface="Estrangelo Edessa"/>
+        <a:font script="Syre" typeface="Estrangelo Edessa"/>
+        <a:font script="Sora" typeface="Nirmala UI"/>
+        <a:font script="Tale" typeface="Microsoft Tai Le"/>
+        <a:font script="Talu" typeface="Microsoft New Tai Lue"/>
+        <a:font script="Tfng" typeface="Ebrima"/>
+      </a:majorFont>
+      <a:minorFont>
+        <a:latin typeface="Calibri" panose="020F0502020204030204"/>
+        <a:ea typeface=""/>
+        <a:cs typeface=""/>
+        <a:font script="Jpan" typeface="游ゴシック"/>
+        <a:font script="Hang" typeface="맑은 고딕"/>
+        <a:font script="Hans" typeface="等线"/>
+        <a:font script="Hant" typeface="新細明體"/>
+        <a:font script="Arab" typeface="Arial"/>
+        <a:font script="Hebr" typeface="Arial"/>
+        <a:font script="Thai" typeface="Cordia New"/>
+        <a:font script="Ethi" typeface="Nyala"/>
+        <a:font script="Beng" typeface="Vrinda"/>
+        <a:font script="Gujr" typeface="Shruti"/>
+        <a:font script="Khmr" typeface="DaunPenh"/>
+        <a:font script="Knda" typeface="Tunga"/>
+        <a:font script="Guru" typeface="Raavi"/>
+        <a:font script="Cans" typeface="Euphemia"/>
+        <a:font script="Cher" typeface="Plantagenet Cherokee"/>
+        <a:font script="Yiii" typeface="Microsoft Yi Baiti"/>
+        <a:font script="Tibt" typeface="Microsoft Himalaya"/>
+        <a:font script="Thaa" typeface="MV Boli"/>
+        <a:font script="Deva" typeface="Mangal"/>
+        <a:font script="Telu" typeface="Gautami"/>
+        <a:font script="Taml" typeface="Latha"/>
+        <a:font script="Syrc" typeface="Estrangelo Edessa"/>
+        <a:font script="Orya" typeface="Kalinga"/>
+        <a:font script="Mlym" typeface="Kartika"/>
+        <a:font script="Laoo" typeface="DokChampa"/>
+        <a:font script="Sinh" typeface="Iskoola Pota"/>
+        <a:font script="Mong" typeface="Mongolian Baiti"/>
+        <a:font script="Viet" typeface="Arial"/>
+        <a:font script="Uigh" typeface="Microsoft Uighur"/>
+        <a:font script="Geor" typeface="Sylfaen"/>
+        <a:font script="Armn" typeface="Arial"/>
+        <a:font script="Bugi" typeface="Leelawadee UI"/>
+        <a:font script="Bopo" typeface="Microsoft JhengHei"/>
+        <a:font script="Java" typeface="Javanese Text"/>
+        <a:font script="Lisu" typeface="Segoe UI"/>
+        <a:font script="Mymr" typeface="Myanmar Text"/>
+        <a:font script="Nkoo" typeface="Ebrima"/>
+        <a:font script="Olck" typeface="Nirmala UI"/>
+        <a:font script="Osma" typeface="Ebrima"/>
+        <a:font script="Phag" typeface="Phagspa"/>
+        <a:font script="Syrn" typeface="Estrangelo Edessa"/>
+        <a:font script="Syrj" typeface="Estrangelo Edessa"/>
+        <a:font script="Syre" typeface="Estrangelo Edessa"/>
+        <a:font script="Sora" typeface="Nirmala UI"/>
+        <a:font script="Tale" typeface="Microsoft Tai Le"/>
+        <a:font script="Talu" typeface="Microsoft New Tai Lue"/>
+        <a:font script="Tfng" typeface="Ebrima"/>
+      </a:minorFont>
+    </a:fontScheme>
+    <a:fmtScheme name="Office">
+      <a:fillStyleLst>
+        <a:solidFill>
+          <a:schemeClr val="phClr"/>
+        </a:solidFill>
+        <a:gradFill rotWithShape="1">
+          <a:gsLst>
+            <a:gs pos="0">
+              <a:schemeClr val="phClr">
+                <a:lumMod val="110000"/>
+                <a:satMod val="105000"/>
+                <a:tint val="67000"/>
+              </a:schemeClr>
+            </a:gs>
+            <a:gs pos="50000">
+              <a:schemeClr val="phClr">
+                <a:lumMod val="105000"/>
+                <a:satMod val="103000"/>
+                <a:tint val="73000"/>
+              </a:schemeClr>
+            </a:gs>
+            <a:gs pos="100000">
+              <a:schemeClr val="phClr">
+                <a:lumMod val="105000"/>
+                <a:satMod val="109000"/>
+                <a:tint val="81000"/>
+              </a:schemeClr>
+            </a:gs>
+          </a:gsLst>
+          <a:lin ang="5400000" scaled="0"/>
+        </a:gradFill>
+        <a:gradFill rotWithShape="1">
+          <a:gsLst>
+            <a:gs pos="0">
+              <a:schemeClr val="phClr">
+                <a:satMod val="103000"/>
+                <a:lumMod val="102000"/>
+                <a:tint val="94000"/>
+              </a:schemeClr>
+            </a:gs>
+            <a:gs pos="50000">
+              <a:schemeClr val="phClr">
+                <a:satMod val="110000"/>
+                <a:lumMod val="100000"/>
+                <a:shade val="100000"/>
+              </a:schemeClr>
+            </a:gs>
+            <a:gs pos="100000">
+              <a:schemeClr val="phClr">
+                <a:lumMod val="99000"/>
+                <a:satMod val="120000"/>
+                <a:shade val="78000"/>
+              </a:schemeClr>
+            </a:gs>
+          </a:gsLst>
+          <a:lin ang="5400000" scaled="0"/>
+        </a:gradFill>
+      </a:fillStyleLst>
+      <a:lnStyleLst>
+        <a:ln w="6350" cap="flat" cmpd="sng" algn="ctr">
+          <a:solidFill>
+            <a:schemeClr val="phClr"/>
+          </a:solidFill>
+          <a:prstDash val="solid"/>
+          <a:miter lim="800000"/>
+        </a:ln>
+        <a:ln w="12700" cap="flat" cmpd="sng" algn="ctr">
+          <a:solidFill>
+            <a:schemeClr val="phClr"/>
+          </a:solidFill>
+          <a:prstDash val="solid"/>
+          <a:miter lim="800000"/>
+        </a:ln>
+        <a:ln w="19050" cap="flat" cmpd="sng" algn="ctr">
+          <a:solidFill>
+            <a:schemeClr val="phClr"/>
+          </a:solidFill>
+          <a:prstDash val="solid"/>
+          <a:miter lim="800000"/>
+        </a:ln>
+      </a:lnStyleLst>
+      <a:effectStyleLst>
+        <a:effectStyle>
+          <a:effectLst/>
+        </a:effectStyle>
+        <a:effectStyle>
+          <a:effectLst/>
+        </a:effectStyle>
+        <a:effectStyle>
+          <a:effectLst>
+            <a:outerShdw blurRad="57150" dist="19050" dir="5400000" algn="ctr" rotWithShape="0">
+              <a:srgbClr val="000000">
+                <a:alpha val="63000"/>
+              </a:srgbClr>
+            </a:outerShdw>
+          </a:effectLst>
+        </a:effectStyle>
+      </a:effectStyleLst>
+      <a:bgFillStyleLst>
+        <a:solidFill>
+          <a:schemeClr val="phClr"/>
+        </a:solidFill>
+        <a:solidFill>
+          <a:schemeClr val="phClr">
+            <a:tint val="95000"/>
+            <a:satMod val="170000"/>
+          </a:schemeClr>
+        </a:solidFill>
+        <a:gradFill rotWithShape="1">
+          <a:gsLst>
+            <a:gs pos="0">
+              <a:schemeClr val="phClr">
+                <a:tint val="93000"/>
+                <a:satMod val="150000"/>
+                <a:shade val="98000"/>
+                <a:lumMod val="102000"/>
+              </a:schemeClr>
+            </a:gs>
+            <a:gs pos="50000">
+              <a:schemeClr val="phClr">
+                <a:tint val="98000"/>
+                <a:satMod val="130000"/>
+                <a:shade val="90000"/>
+                <a:lumMod val="103000"/>
+              </a:schemeClr>
+            </a:gs>
+            <a:gs pos="100000">
+              <a:schemeClr val="phClr">
+                <a:shade val="63000"/>
+                <a:satMod val="120000"/>
+              </a:schemeClr>
+            </a:gs>
+          </a:gsLst>
+          <a:lin ang="5400000" scaled="0"/>
+        </a:gradFill>
+      </a:bgFillStyleLst>
+    </a:fmtScheme>
+  </a:themeElements>
+  <a:objectDefaults/>
+  <a:extraClrSchemeLst/>
+  <a:extLst>
+    <a:ext uri="{05A4C25C-085E-4340-85A3-A5531E510DB2}">
+      <thm15:themeFamily xmlns:thm15="http://schemas.microsoft.com/office/thememl/2012/main" name="Office Theme" id="{62F939B6-93AF-4DB8-9C6B-D6C7DFDC589F}" vid="{4A3C46E8-61CC-4603-A589-7422A47A8E4A}"/>
+    </a:ext>
+  </a:extLst>
+</a:theme>
 </file>
</xml_diff>